<commit_message>
Update presentation, final time, seriously.
</commit_message>
<xml_diff>
--- a/presentation.pptx
+++ b/presentation.pptx
@@ -8,11 +8,22 @@
     <p:sldId id="256" r:id="rId2"/>
     <p:sldId id="259" r:id="rId3"/>
     <p:sldId id="258" r:id="rId4"/>
-    <p:sldId id="260" r:id="rId5"/>
-    <p:sldId id="257" r:id="rId6"/>
-    <p:sldId id="261" r:id="rId7"/>
-    <p:sldId id="262" r:id="rId8"/>
-    <p:sldId id="263" r:id="rId9"/>
+    <p:sldId id="264" r:id="rId5"/>
+    <p:sldId id="260" r:id="rId6"/>
+    <p:sldId id="265" r:id="rId7"/>
+    <p:sldId id="267" r:id="rId8"/>
+    <p:sldId id="268" r:id="rId9"/>
+    <p:sldId id="257" r:id="rId10"/>
+    <p:sldId id="269" r:id="rId11"/>
+    <p:sldId id="277" r:id="rId12"/>
+    <p:sldId id="272" r:id="rId13"/>
+    <p:sldId id="273" r:id="rId14"/>
+    <p:sldId id="274" r:id="rId15"/>
+    <p:sldId id="275" r:id="rId16"/>
+    <p:sldId id="276" r:id="rId17"/>
+    <p:sldId id="261" r:id="rId18"/>
+    <p:sldId id="262" r:id="rId19"/>
+    <p:sldId id="263" r:id="rId20"/>
   </p:sldIdLst>
   <p:sldSz cx="12192000" cy="6858000"/>
   <p:notesSz cx="6858000" cy="9144000"/>
@@ -250,7 +261,7 @@
           <a:p>
             <a:fld id="{99155B02-9703-4DE5-A04D-2B19D3466616}" type="datetimeFigureOut">
               <a:rPr lang="en-US" smtClean="0"/>
-              <a:t>1/23/2019</a:t>
+              <a:t>1/25/2019</a:t>
             </a:fld>
             <a:endParaRPr lang="en-US"/>
           </a:p>
@@ -420,7 +431,7 @@
           <a:p>
             <a:fld id="{99155B02-9703-4DE5-A04D-2B19D3466616}" type="datetimeFigureOut">
               <a:rPr lang="en-US" smtClean="0"/>
-              <a:t>1/23/2019</a:t>
+              <a:t>1/25/2019</a:t>
             </a:fld>
             <a:endParaRPr lang="en-US"/>
           </a:p>
@@ -600,7 +611,7 @@
           <a:p>
             <a:fld id="{99155B02-9703-4DE5-A04D-2B19D3466616}" type="datetimeFigureOut">
               <a:rPr lang="en-US" smtClean="0"/>
-              <a:t>1/23/2019</a:t>
+              <a:t>1/25/2019</a:t>
             </a:fld>
             <a:endParaRPr lang="en-US"/>
           </a:p>
@@ -770,7 +781,7 @@
           <a:p>
             <a:fld id="{99155B02-9703-4DE5-A04D-2B19D3466616}" type="datetimeFigureOut">
               <a:rPr lang="en-US" smtClean="0"/>
-              <a:t>1/23/2019</a:t>
+              <a:t>1/25/2019</a:t>
             </a:fld>
             <a:endParaRPr lang="en-US"/>
           </a:p>
@@ -1016,7 +1027,7 @@
           <a:p>
             <a:fld id="{99155B02-9703-4DE5-A04D-2B19D3466616}" type="datetimeFigureOut">
               <a:rPr lang="en-US" smtClean="0"/>
-              <a:t>1/23/2019</a:t>
+              <a:t>1/25/2019</a:t>
             </a:fld>
             <a:endParaRPr lang="en-US"/>
           </a:p>
@@ -1248,7 +1259,7 @@
           <a:p>
             <a:fld id="{99155B02-9703-4DE5-A04D-2B19D3466616}" type="datetimeFigureOut">
               <a:rPr lang="en-US" smtClean="0"/>
-              <a:t>1/23/2019</a:t>
+              <a:t>1/25/2019</a:t>
             </a:fld>
             <a:endParaRPr lang="en-US"/>
           </a:p>
@@ -1615,7 +1626,7 @@
           <a:p>
             <a:fld id="{99155B02-9703-4DE5-A04D-2B19D3466616}" type="datetimeFigureOut">
               <a:rPr lang="en-US" smtClean="0"/>
-              <a:t>1/23/2019</a:t>
+              <a:t>1/25/2019</a:t>
             </a:fld>
             <a:endParaRPr lang="en-US"/>
           </a:p>
@@ -1733,7 +1744,7 @@
           <a:p>
             <a:fld id="{99155B02-9703-4DE5-A04D-2B19D3466616}" type="datetimeFigureOut">
               <a:rPr lang="en-US" smtClean="0"/>
-              <a:t>1/23/2019</a:t>
+              <a:t>1/25/2019</a:t>
             </a:fld>
             <a:endParaRPr lang="en-US"/>
           </a:p>
@@ -1828,7 +1839,7 @@
           <a:p>
             <a:fld id="{99155B02-9703-4DE5-A04D-2B19D3466616}" type="datetimeFigureOut">
               <a:rPr lang="en-US" smtClean="0"/>
-              <a:t>1/23/2019</a:t>
+              <a:t>1/25/2019</a:t>
             </a:fld>
             <a:endParaRPr lang="en-US"/>
           </a:p>
@@ -2105,7 +2116,7 @@
           <a:p>
             <a:fld id="{99155B02-9703-4DE5-A04D-2B19D3466616}" type="datetimeFigureOut">
               <a:rPr lang="en-US" smtClean="0"/>
-              <a:t>1/23/2019</a:t>
+              <a:t>1/25/2019</a:t>
             </a:fld>
             <a:endParaRPr lang="en-US"/>
           </a:p>
@@ -2362,7 +2373,7 @@
           <a:p>
             <a:fld id="{99155B02-9703-4DE5-A04D-2B19D3466616}" type="datetimeFigureOut">
               <a:rPr lang="en-US" smtClean="0"/>
-              <a:t>1/23/2019</a:t>
+              <a:t>1/25/2019</a:t>
             </a:fld>
             <a:endParaRPr lang="en-US"/>
           </a:p>
@@ -2575,7 +2586,7 @@
           <a:p>
             <a:fld id="{99155B02-9703-4DE5-A04D-2B19D3466616}" type="datetimeFigureOut">
               <a:rPr lang="en-US" smtClean="0"/>
-              <a:t>1/23/2019</a:t>
+              <a:t>1/25/2019</a:t>
             </a:fld>
             <a:endParaRPr lang="en-US"/>
           </a:p>
@@ -2995,7 +3006,30 @@
           <a:bodyPr/>
           <a:lstStyle/>
           <a:p>
-            <a:endParaRPr lang="en-US"/>
+            <a:r>
+              <a:rPr lang="en-US" sz="4400" dirty="0" smtClean="0"/>
+              <a:t>Some Take-</a:t>
+            </a:r>
+            <a:r>
+              <a:rPr lang="en-US" sz="4400" dirty="0" err="1" smtClean="0"/>
+              <a:t>aways</a:t>
+            </a:r>
+            <a:r>
+              <a:rPr lang="en-US" sz="4400" dirty="0" smtClean="0"/>
+              <a:t> From the 2019 </a:t>
+            </a:r>
+            <a:br>
+              <a:rPr lang="en-US" sz="4400" dirty="0" smtClean="0"/>
+            </a:br>
+            <a:r>
+              <a:rPr lang="en-US" dirty="0" err="1" smtClean="0"/>
+              <a:t>rstudio</a:t>
+            </a:r>
+            <a:r>
+              <a:rPr lang="en-US" dirty="0" smtClean="0"/>
+              <a:t> conference</a:t>
+            </a:r>
+            <a:endParaRPr lang="en-US" dirty="0"/>
           </a:p>
         </p:txBody>
       </p:sp>
@@ -3014,7 +3048,17 @@
           <a:bodyPr/>
           <a:lstStyle/>
           <a:p>
-            <a:endParaRPr lang="en-US"/>
+            <a:r>
+              <a:rPr lang="en-US" dirty="0" smtClean="0"/>
+              <a:t>Gina Nichols</a:t>
+            </a:r>
+          </a:p>
+          <a:p>
+            <a:r>
+              <a:rPr lang="en-US" dirty="0" smtClean="0"/>
+              <a:t>Jan 25 2019</a:t>
+            </a:r>
+            <a:endParaRPr lang="en-US" dirty="0"/>
           </a:p>
         </p:txBody>
       </p:sp>
@@ -3022,6 +3066,2400 @@
     <p:extLst>
       <p:ext uri="{BB962C8B-B14F-4D97-AF65-F5344CB8AC3E}">
         <p14:creationId xmlns:p14="http://schemas.microsoft.com/office/powerpoint/2010/main" val="915008880"/>
+      </p:ext>
+    </p:extLst>
+  </p:cSld>
+  <p:clrMapOvr>
+    <a:masterClrMapping/>
+  </p:clrMapOvr>
+</p:sld>
+</file>
+
+<file path=ppt/slides/slide10.xml><?xml version="1.0" encoding="utf-8"?>
+<p:sld xmlns:a="http://schemas.openxmlformats.org/drawingml/2006/main" xmlns:r="http://schemas.openxmlformats.org/officeDocument/2006/relationships" xmlns:p="http://schemas.openxmlformats.org/presentationml/2006/main">
+  <p:cSld>
+    <p:spTree>
+      <p:nvGrpSpPr>
+        <p:cNvPr id="1" name=""/>
+        <p:cNvGrpSpPr/>
+        <p:nvPr/>
+      </p:nvGrpSpPr>
+      <p:grpSpPr>
+        <a:xfrm>
+          <a:off x="0" y="0"/>
+          <a:ext cx="0" cy="0"/>
+          <a:chOff x="0" y="0"/>
+          <a:chExt cx="0" cy="0"/>
+        </a:xfrm>
+      </p:grpSpPr>
+      <p:sp>
+        <p:nvSpPr>
+          <p:cNvPr id="2" name="Title 1"/>
+          <p:cNvSpPr>
+            <a:spLocks noGrp="1"/>
+          </p:cNvSpPr>
+          <p:nvPr>
+            <p:ph type="title"/>
+          </p:nvPr>
+        </p:nvSpPr>
+        <p:spPr/>
+        <p:txBody>
+          <a:bodyPr/>
+          <a:lstStyle/>
+          <a:p>
+            <a:r>
+              <a:rPr lang="en-US" dirty="0" smtClean="0"/>
+              <a:t>Split and do have fallen out of favor</a:t>
+            </a:r>
+            <a:br>
+              <a:rPr lang="en-US" dirty="0" smtClean="0"/>
+            </a:br>
+            <a:r>
+              <a:rPr lang="en-US" dirty="0" smtClean="0"/>
+              <a:t>nest and map are preferred</a:t>
+            </a:r>
+            <a:endParaRPr lang="en-US" i="1" dirty="0"/>
+          </a:p>
+        </p:txBody>
+      </p:sp>
+      <p:sp>
+        <p:nvSpPr>
+          <p:cNvPr id="3" name="Content Placeholder 2"/>
+          <p:cNvSpPr>
+            <a:spLocks noGrp="1"/>
+          </p:cNvSpPr>
+          <p:nvPr>
+            <p:ph idx="1"/>
+          </p:nvPr>
+        </p:nvSpPr>
+        <p:spPr/>
+        <p:txBody>
+          <a:bodyPr>
+            <a:normAutofit lnSpcReduction="10000"/>
+          </a:bodyPr>
+          <a:lstStyle/>
+          <a:p>
+            <a:pPr marL="0" indent="0">
+              <a:buNone/>
+            </a:pPr>
+            <a:r>
+              <a:rPr lang="en-US" dirty="0" err="1"/>
+              <a:t>d</a:t>
+            </a:r>
+            <a:r>
+              <a:rPr lang="en-US" dirty="0" err="1" smtClean="0"/>
+              <a:t>at</a:t>
+            </a:r>
+            <a:r>
+              <a:rPr lang="en-US" dirty="0" smtClean="0"/>
+              <a:t> %&gt;%</a:t>
+            </a:r>
+          </a:p>
+          <a:p>
+            <a:pPr marL="0" indent="0">
+              <a:buNone/>
+            </a:pPr>
+            <a:endParaRPr lang="en-US" dirty="0" smtClean="0"/>
+          </a:p>
+          <a:p>
+            <a:pPr marL="0" indent="0">
+              <a:buNone/>
+            </a:pPr>
+            <a:r>
+              <a:rPr lang="en-US" dirty="0" smtClean="0"/>
+              <a:t>	</a:t>
+            </a:r>
+            <a:r>
+              <a:rPr lang="en-US" dirty="0" err="1" smtClean="0"/>
+              <a:t>group_by</a:t>
+            </a:r>
+            <a:r>
+              <a:rPr lang="en-US" dirty="0" smtClean="0"/>
+              <a:t>(crop, </a:t>
+            </a:r>
+            <a:r>
+              <a:rPr lang="en-US" dirty="0" err="1" smtClean="0"/>
+              <a:t>pos</a:t>
+            </a:r>
+            <a:r>
+              <a:rPr lang="en-US" dirty="0" smtClean="0"/>
+              <a:t>) %&gt;%</a:t>
+            </a:r>
+          </a:p>
+          <a:p>
+            <a:pPr marL="0" indent="0">
+              <a:buNone/>
+            </a:pPr>
+            <a:endParaRPr lang="en-US" dirty="0" smtClean="0"/>
+          </a:p>
+          <a:p>
+            <a:pPr marL="0" indent="0">
+              <a:buNone/>
+            </a:pPr>
+            <a:r>
+              <a:rPr lang="en-US" dirty="0"/>
+              <a:t> </a:t>
+            </a:r>
+            <a:r>
+              <a:rPr lang="en-US" dirty="0" smtClean="0"/>
+              <a:t>  	nest() %&gt;%</a:t>
+            </a:r>
+          </a:p>
+          <a:p>
+            <a:pPr marL="0" indent="0">
+              <a:buNone/>
+            </a:pPr>
+            <a:endParaRPr lang="en-US" dirty="0" smtClean="0"/>
+          </a:p>
+          <a:p>
+            <a:pPr marL="0" indent="0">
+              <a:buNone/>
+            </a:pPr>
+            <a:r>
+              <a:rPr lang="en-US" dirty="0"/>
+              <a:t>	</a:t>
+            </a:r>
+            <a:r>
+              <a:rPr lang="en-US" dirty="0" smtClean="0"/>
+              <a:t>mutate( </a:t>
+            </a:r>
+            <a:r>
+              <a:rPr lang="en-US" dirty="0" err="1" smtClean="0"/>
+              <a:t>myres</a:t>
+            </a:r>
+            <a:r>
+              <a:rPr lang="en-US" dirty="0" smtClean="0"/>
+              <a:t> = map(data, </a:t>
+            </a:r>
+            <a:r>
+              <a:rPr lang="en-US" dirty="0" err="1" smtClean="0"/>
+              <a:t>myfun</a:t>
+            </a:r>
+            <a:r>
+              <a:rPr lang="en-US" dirty="0" smtClean="0"/>
+              <a:t>)) %&gt;%</a:t>
+            </a:r>
+          </a:p>
+          <a:p>
+            <a:pPr marL="0" indent="0">
+              <a:buNone/>
+            </a:pPr>
+            <a:endParaRPr lang="en-US" dirty="0" smtClean="0"/>
+          </a:p>
+          <a:p>
+            <a:pPr marL="0" indent="0">
+              <a:buNone/>
+            </a:pPr>
+            <a:r>
+              <a:rPr lang="en-US" dirty="0"/>
+              <a:t>	</a:t>
+            </a:r>
+            <a:r>
+              <a:rPr lang="en-US" dirty="0" err="1" smtClean="0"/>
+              <a:t>unnest</a:t>
+            </a:r>
+            <a:r>
+              <a:rPr lang="en-US" dirty="0" smtClean="0"/>
+              <a:t>()</a:t>
+            </a:r>
+            <a:endParaRPr lang="en-US" dirty="0"/>
+          </a:p>
+        </p:txBody>
+      </p:sp>
+    </p:spTree>
+    <p:extLst>
+      <p:ext uri="{BB962C8B-B14F-4D97-AF65-F5344CB8AC3E}">
+        <p14:creationId xmlns:p14="http://schemas.microsoft.com/office/powerpoint/2010/main" val="1913625631"/>
+      </p:ext>
+    </p:extLst>
+  </p:cSld>
+  <p:clrMapOvr>
+    <a:masterClrMapping/>
+  </p:clrMapOvr>
+</p:sld>
+</file>
+
+<file path=ppt/slides/slide11.xml><?xml version="1.0" encoding="utf-8"?>
+<p:sld xmlns:a="http://schemas.openxmlformats.org/drawingml/2006/main" xmlns:r="http://schemas.openxmlformats.org/officeDocument/2006/relationships" xmlns:p="http://schemas.openxmlformats.org/presentationml/2006/main">
+  <p:cSld>
+    <p:spTree>
+      <p:nvGrpSpPr>
+        <p:cNvPr id="1" name=""/>
+        <p:cNvGrpSpPr/>
+        <p:nvPr/>
+      </p:nvGrpSpPr>
+      <p:grpSpPr>
+        <a:xfrm>
+          <a:off x="0" y="0"/>
+          <a:ext cx="0" cy="0"/>
+          <a:chOff x="0" y="0"/>
+          <a:chExt cx="0" cy="0"/>
+        </a:xfrm>
+      </p:grpSpPr>
+      <p:sp>
+        <p:nvSpPr>
+          <p:cNvPr id="3" name="Content Placeholder 2"/>
+          <p:cNvSpPr>
+            <a:spLocks noGrp="1"/>
+          </p:cNvSpPr>
+          <p:nvPr>
+            <p:ph idx="1"/>
+          </p:nvPr>
+        </p:nvSpPr>
+        <p:spPr/>
+        <p:txBody>
+          <a:bodyPr>
+            <a:normAutofit lnSpcReduction="10000"/>
+          </a:bodyPr>
+          <a:lstStyle/>
+          <a:p>
+            <a:pPr marL="0" indent="0">
+              <a:buNone/>
+            </a:pPr>
+            <a:r>
+              <a:rPr lang="en-US" dirty="0" err="1"/>
+              <a:t>d</a:t>
+            </a:r>
+            <a:r>
+              <a:rPr lang="en-US" dirty="0" err="1" smtClean="0"/>
+              <a:t>at</a:t>
+            </a:r>
+            <a:r>
+              <a:rPr lang="en-US" dirty="0" smtClean="0"/>
+              <a:t> %&gt;%</a:t>
+            </a:r>
+          </a:p>
+          <a:p>
+            <a:pPr marL="0" indent="0">
+              <a:buNone/>
+            </a:pPr>
+            <a:endParaRPr lang="en-US" dirty="0" smtClean="0"/>
+          </a:p>
+          <a:p>
+            <a:pPr marL="0" indent="0">
+              <a:buNone/>
+            </a:pPr>
+            <a:r>
+              <a:rPr lang="en-US" dirty="0" smtClean="0"/>
+              <a:t>	</a:t>
+            </a:r>
+            <a:r>
+              <a:rPr lang="en-US" dirty="0" err="1" smtClean="0"/>
+              <a:t>group_by</a:t>
+            </a:r>
+            <a:r>
+              <a:rPr lang="en-US" dirty="0" smtClean="0"/>
+              <a:t>(crop, </a:t>
+            </a:r>
+            <a:r>
+              <a:rPr lang="en-US" dirty="0" err="1" smtClean="0"/>
+              <a:t>pos</a:t>
+            </a:r>
+            <a:r>
+              <a:rPr lang="en-US" dirty="0" smtClean="0"/>
+              <a:t>) %&gt;%</a:t>
+            </a:r>
+          </a:p>
+          <a:p>
+            <a:pPr marL="0" indent="0">
+              <a:buNone/>
+            </a:pPr>
+            <a:endParaRPr lang="en-US" dirty="0" smtClean="0"/>
+          </a:p>
+          <a:p>
+            <a:pPr marL="0" indent="0">
+              <a:buNone/>
+            </a:pPr>
+            <a:r>
+              <a:rPr lang="en-US" dirty="0"/>
+              <a:t> </a:t>
+            </a:r>
+            <a:r>
+              <a:rPr lang="en-US" dirty="0" smtClean="0"/>
+              <a:t>  	nest() %&gt;%</a:t>
+            </a:r>
+          </a:p>
+          <a:p>
+            <a:pPr marL="0" indent="0">
+              <a:buNone/>
+            </a:pPr>
+            <a:endParaRPr lang="en-US" dirty="0" smtClean="0"/>
+          </a:p>
+          <a:p>
+            <a:pPr marL="0" indent="0">
+              <a:buNone/>
+            </a:pPr>
+            <a:r>
+              <a:rPr lang="en-US" dirty="0"/>
+              <a:t>	</a:t>
+            </a:r>
+            <a:r>
+              <a:rPr lang="en-US" dirty="0" smtClean="0"/>
+              <a:t>mutate( </a:t>
+            </a:r>
+            <a:r>
+              <a:rPr lang="en-US" dirty="0" err="1" smtClean="0"/>
+              <a:t>myres</a:t>
+            </a:r>
+            <a:r>
+              <a:rPr lang="en-US" dirty="0" smtClean="0"/>
+              <a:t> = map(data, </a:t>
+            </a:r>
+            <a:r>
+              <a:rPr lang="en-US" dirty="0" err="1" smtClean="0"/>
+              <a:t>myfun</a:t>
+            </a:r>
+            <a:r>
+              <a:rPr lang="en-US" dirty="0" smtClean="0"/>
+              <a:t>)) %&gt;%</a:t>
+            </a:r>
+          </a:p>
+          <a:p>
+            <a:pPr marL="0" indent="0">
+              <a:buNone/>
+            </a:pPr>
+            <a:endParaRPr lang="en-US" dirty="0" smtClean="0"/>
+          </a:p>
+          <a:p>
+            <a:pPr marL="0" indent="0">
+              <a:buNone/>
+            </a:pPr>
+            <a:r>
+              <a:rPr lang="en-US" dirty="0"/>
+              <a:t>	</a:t>
+            </a:r>
+            <a:r>
+              <a:rPr lang="en-US" dirty="0" err="1" smtClean="0"/>
+              <a:t>unnest</a:t>
+            </a:r>
+            <a:r>
+              <a:rPr lang="en-US" dirty="0" smtClean="0"/>
+              <a:t>()</a:t>
+            </a:r>
+            <a:endParaRPr lang="en-US" dirty="0"/>
+          </a:p>
+        </p:txBody>
+      </p:sp>
+      <p:pic>
+        <p:nvPicPr>
+          <p:cNvPr id="4" name="Picture 3"/>
+          <p:cNvPicPr>
+            <a:picLocks noChangeAspect="1"/>
+          </p:cNvPicPr>
+          <p:nvPr/>
+        </p:nvPicPr>
+        <p:blipFill>
+          <a:blip r:embed="rId2"/>
+          <a:stretch>
+            <a:fillRect/>
+          </a:stretch>
+        </p:blipFill>
+        <p:spPr>
+          <a:xfrm>
+            <a:off x="2422439" y="152915"/>
+            <a:ext cx="4381500" cy="2400300"/>
+          </a:xfrm>
+          <a:prstGeom prst="rect">
+            <a:avLst/>
+          </a:prstGeom>
+        </p:spPr>
+      </p:pic>
+      <p:pic>
+        <p:nvPicPr>
+          <p:cNvPr id="5" name="Picture 4"/>
+          <p:cNvPicPr>
+            <a:picLocks noChangeAspect="1"/>
+          </p:cNvPicPr>
+          <p:nvPr/>
+        </p:nvPicPr>
+        <p:blipFill>
+          <a:blip r:embed="rId3"/>
+          <a:stretch>
+            <a:fillRect/>
+          </a:stretch>
+        </p:blipFill>
+        <p:spPr>
+          <a:xfrm>
+            <a:off x="6096000" y="2759075"/>
+            <a:ext cx="3095625" cy="1466850"/>
+          </a:xfrm>
+          <a:prstGeom prst="rect">
+            <a:avLst/>
+          </a:prstGeom>
+        </p:spPr>
+      </p:pic>
+      <p:pic>
+        <p:nvPicPr>
+          <p:cNvPr id="6" name="Picture 5"/>
+          <p:cNvPicPr>
+            <a:picLocks noChangeAspect="1"/>
+          </p:cNvPicPr>
+          <p:nvPr/>
+        </p:nvPicPr>
+        <p:blipFill>
+          <a:blip r:embed="rId4"/>
+          <a:stretch>
+            <a:fillRect/>
+          </a:stretch>
+        </p:blipFill>
+        <p:spPr>
+          <a:xfrm>
+            <a:off x="7958651" y="4431785"/>
+            <a:ext cx="3752850" cy="1352550"/>
+          </a:xfrm>
+          <a:prstGeom prst="rect">
+            <a:avLst/>
+          </a:prstGeom>
+        </p:spPr>
+      </p:pic>
+      <p:pic>
+        <p:nvPicPr>
+          <p:cNvPr id="7" name="Picture 6"/>
+          <p:cNvPicPr>
+            <a:picLocks noChangeAspect="1"/>
+          </p:cNvPicPr>
+          <p:nvPr/>
+        </p:nvPicPr>
+        <p:blipFill>
+          <a:blip r:embed="rId5"/>
+          <a:stretch>
+            <a:fillRect/>
+          </a:stretch>
+        </p:blipFill>
+        <p:spPr>
+          <a:xfrm>
+            <a:off x="3435177" y="5273114"/>
+            <a:ext cx="3838575" cy="1479596"/>
+          </a:xfrm>
+          <a:prstGeom prst="rect">
+            <a:avLst/>
+          </a:prstGeom>
+        </p:spPr>
+      </p:pic>
+      <p:sp>
+        <p:nvSpPr>
+          <p:cNvPr id="8" name="Rectangle 7"/>
+          <p:cNvSpPr/>
+          <p:nvPr/>
+        </p:nvSpPr>
+        <p:spPr>
+          <a:xfrm>
+            <a:off x="838200" y="2677297"/>
+            <a:ext cx="11197281" cy="4180703"/>
+          </a:xfrm>
+          <a:prstGeom prst="rect">
+            <a:avLst/>
+          </a:prstGeom>
+          <a:solidFill>
+            <a:schemeClr val="bg1"/>
+          </a:solidFill>
+          <a:ln>
+            <a:noFill/>
+          </a:ln>
+        </p:spPr>
+        <p:style>
+          <a:lnRef idx="2">
+            <a:schemeClr val="accent1">
+              <a:shade val="50000"/>
+            </a:schemeClr>
+          </a:lnRef>
+          <a:fillRef idx="1">
+            <a:schemeClr val="accent1"/>
+          </a:fillRef>
+          <a:effectRef idx="0">
+            <a:schemeClr val="accent1"/>
+          </a:effectRef>
+          <a:fontRef idx="minor">
+            <a:schemeClr val="lt1"/>
+          </a:fontRef>
+        </p:style>
+        <p:txBody>
+          <a:bodyPr rtlCol="0" anchor="ctr"/>
+          <a:lstStyle/>
+          <a:p>
+            <a:pPr algn="ctr"/>
+            <a:endParaRPr lang="en-US"/>
+          </a:p>
+        </p:txBody>
+      </p:sp>
+    </p:spTree>
+    <p:extLst>
+      <p:ext uri="{BB962C8B-B14F-4D97-AF65-F5344CB8AC3E}">
+        <p14:creationId xmlns:p14="http://schemas.microsoft.com/office/powerpoint/2010/main" val="1347094834"/>
+      </p:ext>
+    </p:extLst>
+  </p:cSld>
+  <p:clrMapOvr>
+    <a:masterClrMapping/>
+  </p:clrMapOvr>
+</p:sld>
+</file>
+
+<file path=ppt/slides/slide12.xml><?xml version="1.0" encoding="utf-8"?>
+<p:sld xmlns:a="http://schemas.openxmlformats.org/drawingml/2006/main" xmlns:r="http://schemas.openxmlformats.org/officeDocument/2006/relationships" xmlns:p="http://schemas.openxmlformats.org/presentationml/2006/main">
+  <p:cSld>
+    <p:spTree>
+      <p:nvGrpSpPr>
+        <p:cNvPr id="1" name=""/>
+        <p:cNvGrpSpPr/>
+        <p:nvPr/>
+      </p:nvGrpSpPr>
+      <p:grpSpPr>
+        <a:xfrm>
+          <a:off x="0" y="0"/>
+          <a:ext cx="0" cy="0"/>
+          <a:chOff x="0" y="0"/>
+          <a:chExt cx="0" cy="0"/>
+        </a:xfrm>
+      </p:grpSpPr>
+      <p:sp>
+        <p:nvSpPr>
+          <p:cNvPr id="3" name="Content Placeholder 2"/>
+          <p:cNvSpPr>
+            <a:spLocks noGrp="1"/>
+          </p:cNvSpPr>
+          <p:nvPr>
+            <p:ph idx="1"/>
+          </p:nvPr>
+        </p:nvSpPr>
+        <p:spPr/>
+        <p:txBody>
+          <a:bodyPr>
+            <a:normAutofit lnSpcReduction="10000"/>
+          </a:bodyPr>
+          <a:lstStyle/>
+          <a:p>
+            <a:pPr marL="0" indent="0">
+              <a:buNone/>
+            </a:pPr>
+            <a:r>
+              <a:rPr lang="en-US" dirty="0" err="1"/>
+              <a:t>d</a:t>
+            </a:r>
+            <a:r>
+              <a:rPr lang="en-US" dirty="0" err="1" smtClean="0"/>
+              <a:t>at</a:t>
+            </a:r>
+            <a:r>
+              <a:rPr lang="en-US" dirty="0" smtClean="0"/>
+              <a:t> %&gt;%</a:t>
+            </a:r>
+          </a:p>
+          <a:p>
+            <a:pPr marL="0" indent="0">
+              <a:buNone/>
+            </a:pPr>
+            <a:endParaRPr lang="en-US" dirty="0" smtClean="0"/>
+          </a:p>
+          <a:p>
+            <a:pPr marL="0" indent="0">
+              <a:buNone/>
+            </a:pPr>
+            <a:r>
+              <a:rPr lang="en-US" dirty="0" smtClean="0"/>
+              <a:t>	</a:t>
+            </a:r>
+            <a:r>
+              <a:rPr lang="en-US" dirty="0" err="1" smtClean="0"/>
+              <a:t>group_by</a:t>
+            </a:r>
+            <a:r>
+              <a:rPr lang="en-US" dirty="0" smtClean="0"/>
+              <a:t>(crop, </a:t>
+            </a:r>
+            <a:r>
+              <a:rPr lang="en-US" dirty="0" err="1" smtClean="0"/>
+              <a:t>pos</a:t>
+            </a:r>
+            <a:r>
+              <a:rPr lang="en-US" dirty="0" smtClean="0"/>
+              <a:t>) %&gt;%</a:t>
+            </a:r>
+          </a:p>
+          <a:p>
+            <a:pPr marL="0" indent="0">
+              <a:buNone/>
+            </a:pPr>
+            <a:endParaRPr lang="en-US" dirty="0" smtClean="0"/>
+          </a:p>
+          <a:p>
+            <a:pPr marL="0" indent="0">
+              <a:buNone/>
+            </a:pPr>
+            <a:r>
+              <a:rPr lang="en-US" dirty="0"/>
+              <a:t> </a:t>
+            </a:r>
+            <a:r>
+              <a:rPr lang="en-US" dirty="0" smtClean="0"/>
+              <a:t>  	nest() %&gt;%</a:t>
+            </a:r>
+          </a:p>
+          <a:p>
+            <a:pPr marL="0" indent="0">
+              <a:buNone/>
+            </a:pPr>
+            <a:endParaRPr lang="en-US" dirty="0" smtClean="0"/>
+          </a:p>
+          <a:p>
+            <a:pPr marL="0" indent="0">
+              <a:buNone/>
+            </a:pPr>
+            <a:r>
+              <a:rPr lang="en-US" dirty="0"/>
+              <a:t>	</a:t>
+            </a:r>
+            <a:r>
+              <a:rPr lang="en-US" dirty="0" smtClean="0"/>
+              <a:t>mutate( </a:t>
+            </a:r>
+            <a:r>
+              <a:rPr lang="en-US" dirty="0" err="1" smtClean="0"/>
+              <a:t>myres</a:t>
+            </a:r>
+            <a:r>
+              <a:rPr lang="en-US" dirty="0" smtClean="0"/>
+              <a:t> = map(data, </a:t>
+            </a:r>
+            <a:r>
+              <a:rPr lang="en-US" dirty="0" err="1" smtClean="0"/>
+              <a:t>myfun</a:t>
+            </a:r>
+            <a:r>
+              <a:rPr lang="en-US" dirty="0" smtClean="0"/>
+              <a:t>)) %&gt;%</a:t>
+            </a:r>
+          </a:p>
+          <a:p>
+            <a:pPr marL="0" indent="0">
+              <a:buNone/>
+            </a:pPr>
+            <a:endParaRPr lang="en-US" dirty="0" smtClean="0"/>
+          </a:p>
+          <a:p>
+            <a:pPr marL="0" indent="0">
+              <a:buNone/>
+            </a:pPr>
+            <a:r>
+              <a:rPr lang="en-US" dirty="0"/>
+              <a:t>	</a:t>
+            </a:r>
+            <a:r>
+              <a:rPr lang="en-US" dirty="0" err="1" smtClean="0"/>
+              <a:t>unnest</a:t>
+            </a:r>
+            <a:r>
+              <a:rPr lang="en-US" dirty="0" smtClean="0"/>
+              <a:t>()</a:t>
+            </a:r>
+            <a:endParaRPr lang="en-US" dirty="0"/>
+          </a:p>
+        </p:txBody>
+      </p:sp>
+      <p:pic>
+        <p:nvPicPr>
+          <p:cNvPr id="4" name="Picture 3"/>
+          <p:cNvPicPr>
+            <a:picLocks noChangeAspect="1"/>
+          </p:cNvPicPr>
+          <p:nvPr/>
+        </p:nvPicPr>
+        <p:blipFill>
+          <a:blip r:embed="rId2"/>
+          <a:stretch>
+            <a:fillRect/>
+          </a:stretch>
+        </p:blipFill>
+        <p:spPr>
+          <a:xfrm>
+            <a:off x="2422439" y="152915"/>
+            <a:ext cx="4381500" cy="2400300"/>
+          </a:xfrm>
+          <a:prstGeom prst="rect">
+            <a:avLst/>
+          </a:prstGeom>
+        </p:spPr>
+      </p:pic>
+      <p:pic>
+        <p:nvPicPr>
+          <p:cNvPr id="6" name="Picture 5"/>
+          <p:cNvPicPr>
+            <a:picLocks noChangeAspect="1"/>
+          </p:cNvPicPr>
+          <p:nvPr/>
+        </p:nvPicPr>
+        <p:blipFill>
+          <a:blip r:embed="rId3"/>
+          <a:stretch>
+            <a:fillRect/>
+          </a:stretch>
+        </p:blipFill>
+        <p:spPr>
+          <a:xfrm>
+            <a:off x="7958651" y="4431785"/>
+            <a:ext cx="3752850" cy="1352550"/>
+          </a:xfrm>
+          <a:prstGeom prst="rect">
+            <a:avLst/>
+          </a:prstGeom>
+        </p:spPr>
+      </p:pic>
+      <p:pic>
+        <p:nvPicPr>
+          <p:cNvPr id="7" name="Picture 6"/>
+          <p:cNvPicPr>
+            <a:picLocks noChangeAspect="1"/>
+          </p:cNvPicPr>
+          <p:nvPr/>
+        </p:nvPicPr>
+        <p:blipFill>
+          <a:blip r:embed="rId4"/>
+          <a:stretch>
+            <a:fillRect/>
+          </a:stretch>
+        </p:blipFill>
+        <p:spPr>
+          <a:xfrm>
+            <a:off x="3435177" y="5273114"/>
+            <a:ext cx="3838575" cy="1479596"/>
+          </a:xfrm>
+          <a:prstGeom prst="rect">
+            <a:avLst/>
+          </a:prstGeom>
+        </p:spPr>
+      </p:pic>
+      <p:sp>
+        <p:nvSpPr>
+          <p:cNvPr id="8" name="Rectangle 7"/>
+          <p:cNvSpPr/>
+          <p:nvPr/>
+        </p:nvSpPr>
+        <p:spPr>
+          <a:xfrm>
+            <a:off x="838200" y="3303373"/>
+            <a:ext cx="11197281" cy="3554627"/>
+          </a:xfrm>
+          <a:prstGeom prst="rect">
+            <a:avLst/>
+          </a:prstGeom>
+          <a:solidFill>
+            <a:schemeClr val="bg1"/>
+          </a:solidFill>
+          <a:ln>
+            <a:noFill/>
+          </a:ln>
+        </p:spPr>
+        <p:style>
+          <a:lnRef idx="2">
+            <a:schemeClr val="accent1">
+              <a:shade val="50000"/>
+            </a:schemeClr>
+          </a:lnRef>
+          <a:fillRef idx="1">
+            <a:schemeClr val="accent1"/>
+          </a:fillRef>
+          <a:effectRef idx="0">
+            <a:schemeClr val="accent1"/>
+          </a:effectRef>
+          <a:fontRef idx="minor">
+            <a:schemeClr val="lt1"/>
+          </a:fontRef>
+        </p:style>
+        <p:txBody>
+          <a:bodyPr rtlCol="0" anchor="ctr"/>
+          <a:lstStyle/>
+          <a:p>
+            <a:pPr algn="ctr"/>
+            <a:endParaRPr lang="en-US"/>
+          </a:p>
+        </p:txBody>
+      </p:sp>
+      <p:sp>
+        <p:nvSpPr>
+          <p:cNvPr id="9" name="Oval 8"/>
+          <p:cNvSpPr/>
+          <p:nvPr/>
+        </p:nvSpPr>
+        <p:spPr>
+          <a:xfrm>
+            <a:off x="3435176" y="450850"/>
+            <a:ext cx="774359" cy="2399442"/>
+          </a:xfrm>
+          <a:prstGeom prst="ellipse">
+            <a:avLst/>
+          </a:prstGeom>
+          <a:noFill/>
+          <a:ln w="38100">
+            <a:solidFill>
+              <a:srgbClr val="FF0000"/>
+            </a:solidFill>
+          </a:ln>
+        </p:spPr>
+        <p:style>
+          <a:lnRef idx="2">
+            <a:schemeClr val="accent1">
+              <a:shade val="50000"/>
+            </a:schemeClr>
+          </a:lnRef>
+          <a:fillRef idx="1">
+            <a:schemeClr val="accent1"/>
+          </a:fillRef>
+          <a:effectRef idx="0">
+            <a:schemeClr val="accent1"/>
+          </a:effectRef>
+          <a:fontRef idx="minor">
+            <a:schemeClr val="lt1"/>
+          </a:fontRef>
+        </p:style>
+        <p:txBody>
+          <a:bodyPr rtlCol="0" anchor="ctr"/>
+          <a:lstStyle/>
+          <a:p>
+            <a:pPr algn="ctr"/>
+            <a:endParaRPr lang="en-US"/>
+          </a:p>
+        </p:txBody>
+      </p:sp>
+      <p:sp>
+        <p:nvSpPr>
+          <p:cNvPr id="10" name="Oval 9"/>
+          <p:cNvSpPr/>
+          <p:nvPr/>
+        </p:nvSpPr>
+        <p:spPr>
+          <a:xfrm>
+            <a:off x="5222272" y="441647"/>
+            <a:ext cx="774359" cy="2399442"/>
+          </a:xfrm>
+          <a:prstGeom prst="ellipse">
+            <a:avLst/>
+          </a:prstGeom>
+          <a:noFill/>
+          <a:ln w="38100">
+            <a:solidFill>
+              <a:srgbClr val="FF0000"/>
+            </a:solidFill>
+          </a:ln>
+        </p:spPr>
+        <p:style>
+          <a:lnRef idx="2">
+            <a:schemeClr val="accent1">
+              <a:shade val="50000"/>
+            </a:schemeClr>
+          </a:lnRef>
+          <a:fillRef idx="1">
+            <a:schemeClr val="accent1"/>
+          </a:fillRef>
+          <a:effectRef idx="0">
+            <a:schemeClr val="accent1"/>
+          </a:effectRef>
+          <a:fontRef idx="minor">
+            <a:schemeClr val="lt1"/>
+          </a:fontRef>
+        </p:style>
+        <p:txBody>
+          <a:bodyPr rtlCol="0" anchor="ctr"/>
+          <a:lstStyle/>
+          <a:p>
+            <a:pPr algn="ctr"/>
+            <a:endParaRPr lang="en-US"/>
+          </a:p>
+        </p:txBody>
+      </p:sp>
+    </p:spTree>
+    <p:extLst>
+      <p:ext uri="{BB962C8B-B14F-4D97-AF65-F5344CB8AC3E}">
+        <p14:creationId xmlns:p14="http://schemas.microsoft.com/office/powerpoint/2010/main" val="2787268021"/>
+      </p:ext>
+    </p:extLst>
+  </p:cSld>
+  <p:clrMapOvr>
+    <a:masterClrMapping/>
+  </p:clrMapOvr>
+</p:sld>
+</file>
+
+<file path=ppt/slides/slide13.xml><?xml version="1.0" encoding="utf-8"?>
+<p:sld xmlns:a="http://schemas.openxmlformats.org/drawingml/2006/main" xmlns:r="http://schemas.openxmlformats.org/officeDocument/2006/relationships" xmlns:p="http://schemas.openxmlformats.org/presentationml/2006/main">
+  <p:cSld>
+    <p:spTree>
+      <p:nvGrpSpPr>
+        <p:cNvPr id="1" name=""/>
+        <p:cNvGrpSpPr/>
+        <p:nvPr/>
+      </p:nvGrpSpPr>
+      <p:grpSpPr>
+        <a:xfrm>
+          <a:off x="0" y="0"/>
+          <a:ext cx="0" cy="0"/>
+          <a:chOff x="0" y="0"/>
+          <a:chExt cx="0" cy="0"/>
+        </a:xfrm>
+      </p:grpSpPr>
+      <p:sp>
+        <p:nvSpPr>
+          <p:cNvPr id="3" name="Content Placeholder 2"/>
+          <p:cNvSpPr>
+            <a:spLocks noGrp="1"/>
+          </p:cNvSpPr>
+          <p:nvPr>
+            <p:ph idx="1"/>
+          </p:nvPr>
+        </p:nvSpPr>
+        <p:spPr/>
+        <p:txBody>
+          <a:bodyPr>
+            <a:normAutofit lnSpcReduction="10000"/>
+          </a:bodyPr>
+          <a:lstStyle/>
+          <a:p>
+            <a:pPr marL="0" indent="0">
+              <a:buNone/>
+            </a:pPr>
+            <a:r>
+              <a:rPr lang="en-US" dirty="0" err="1"/>
+              <a:t>d</a:t>
+            </a:r>
+            <a:r>
+              <a:rPr lang="en-US" dirty="0" err="1" smtClean="0"/>
+              <a:t>at</a:t>
+            </a:r>
+            <a:r>
+              <a:rPr lang="en-US" dirty="0" smtClean="0"/>
+              <a:t> %&gt;%</a:t>
+            </a:r>
+          </a:p>
+          <a:p>
+            <a:pPr marL="0" indent="0">
+              <a:buNone/>
+            </a:pPr>
+            <a:endParaRPr lang="en-US" dirty="0" smtClean="0"/>
+          </a:p>
+          <a:p>
+            <a:pPr marL="0" indent="0">
+              <a:buNone/>
+            </a:pPr>
+            <a:r>
+              <a:rPr lang="en-US" dirty="0" smtClean="0"/>
+              <a:t>	</a:t>
+            </a:r>
+            <a:r>
+              <a:rPr lang="en-US" dirty="0" err="1" smtClean="0"/>
+              <a:t>group_by</a:t>
+            </a:r>
+            <a:r>
+              <a:rPr lang="en-US" dirty="0" smtClean="0"/>
+              <a:t>(crop, </a:t>
+            </a:r>
+            <a:r>
+              <a:rPr lang="en-US" dirty="0" err="1" smtClean="0"/>
+              <a:t>pos</a:t>
+            </a:r>
+            <a:r>
+              <a:rPr lang="en-US" dirty="0" smtClean="0"/>
+              <a:t>) %&gt;%</a:t>
+            </a:r>
+          </a:p>
+          <a:p>
+            <a:pPr marL="0" indent="0">
+              <a:buNone/>
+            </a:pPr>
+            <a:endParaRPr lang="en-US" dirty="0" smtClean="0"/>
+          </a:p>
+          <a:p>
+            <a:pPr marL="0" indent="0">
+              <a:buNone/>
+            </a:pPr>
+            <a:r>
+              <a:rPr lang="en-US" dirty="0"/>
+              <a:t> </a:t>
+            </a:r>
+            <a:r>
+              <a:rPr lang="en-US" dirty="0" smtClean="0"/>
+              <a:t>  	nest() %&gt;%</a:t>
+            </a:r>
+          </a:p>
+          <a:p>
+            <a:pPr marL="0" indent="0">
+              <a:buNone/>
+            </a:pPr>
+            <a:endParaRPr lang="en-US" dirty="0" smtClean="0"/>
+          </a:p>
+          <a:p>
+            <a:pPr marL="0" indent="0">
+              <a:buNone/>
+            </a:pPr>
+            <a:r>
+              <a:rPr lang="en-US" dirty="0"/>
+              <a:t>	</a:t>
+            </a:r>
+            <a:r>
+              <a:rPr lang="en-US" dirty="0" smtClean="0"/>
+              <a:t>mutate( </a:t>
+            </a:r>
+            <a:r>
+              <a:rPr lang="en-US" dirty="0" err="1" smtClean="0"/>
+              <a:t>myres</a:t>
+            </a:r>
+            <a:r>
+              <a:rPr lang="en-US" dirty="0" smtClean="0"/>
+              <a:t> = map(data, </a:t>
+            </a:r>
+            <a:r>
+              <a:rPr lang="en-US" dirty="0" err="1" smtClean="0"/>
+              <a:t>myfun</a:t>
+            </a:r>
+            <a:r>
+              <a:rPr lang="en-US" dirty="0" smtClean="0"/>
+              <a:t>)) %&gt;%</a:t>
+            </a:r>
+          </a:p>
+          <a:p>
+            <a:pPr marL="0" indent="0">
+              <a:buNone/>
+            </a:pPr>
+            <a:endParaRPr lang="en-US" dirty="0" smtClean="0"/>
+          </a:p>
+          <a:p>
+            <a:pPr marL="0" indent="0">
+              <a:buNone/>
+            </a:pPr>
+            <a:r>
+              <a:rPr lang="en-US" dirty="0"/>
+              <a:t>	</a:t>
+            </a:r>
+            <a:r>
+              <a:rPr lang="en-US" dirty="0" err="1" smtClean="0"/>
+              <a:t>unnest</a:t>
+            </a:r>
+            <a:r>
+              <a:rPr lang="en-US" dirty="0" smtClean="0"/>
+              <a:t>()</a:t>
+            </a:r>
+            <a:endParaRPr lang="en-US" dirty="0"/>
+          </a:p>
+        </p:txBody>
+      </p:sp>
+      <p:pic>
+        <p:nvPicPr>
+          <p:cNvPr id="4" name="Picture 3"/>
+          <p:cNvPicPr>
+            <a:picLocks noChangeAspect="1"/>
+          </p:cNvPicPr>
+          <p:nvPr/>
+        </p:nvPicPr>
+        <p:blipFill>
+          <a:blip r:embed="rId2"/>
+          <a:stretch>
+            <a:fillRect/>
+          </a:stretch>
+        </p:blipFill>
+        <p:spPr>
+          <a:xfrm>
+            <a:off x="2422439" y="152915"/>
+            <a:ext cx="4381500" cy="2400300"/>
+          </a:xfrm>
+          <a:prstGeom prst="rect">
+            <a:avLst/>
+          </a:prstGeom>
+        </p:spPr>
+      </p:pic>
+      <p:pic>
+        <p:nvPicPr>
+          <p:cNvPr id="5" name="Picture 4"/>
+          <p:cNvPicPr>
+            <a:picLocks noChangeAspect="1"/>
+          </p:cNvPicPr>
+          <p:nvPr/>
+        </p:nvPicPr>
+        <p:blipFill>
+          <a:blip r:embed="rId3"/>
+          <a:stretch>
+            <a:fillRect/>
+          </a:stretch>
+        </p:blipFill>
+        <p:spPr>
+          <a:xfrm>
+            <a:off x="6096000" y="2759075"/>
+            <a:ext cx="3095625" cy="1466850"/>
+          </a:xfrm>
+          <a:prstGeom prst="rect">
+            <a:avLst/>
+          </a:prstGeom>
+        </p:spPr>
+      </p:pic>
+      <p:pic>
+        <p:nvPicPr>
+          <p:cNvPr id="6" name="Picture 5"/>
+          <p:cNvPicPr>
+            <a:picLocks noChangeAspect="1"/>
+          </p:cNvPicPr>
+          <p:nvPr/>
+        </p:nvPicPr>
+        <p:blipFill>
+          <a:blip r:embed="rId4"/>
+          <a:stretch>
+            <a:fillRect/>
+          </a:stretch>
+        </p:blipFill>
+        <p:spPr>
+          <a:xfrm>
+            <a:off x="7958651" y="4431785"/>
+            <a:ext cx="3752850" cy="1352550"/>
+          </a:xfrm>
+          <a:prstGeom prst="rect">
+            <a:avLst/>
+          </a:prstGeom>
+        </p:spPr>
+      </p:pic>
+      <p:pic>
+        <p:nvPicPr>
+          <p:cNvPr id="7" name="Picture 6"/>
+          <p:cNvPicPr>
+            <a:picLocks noChangeAspect="1"/>
+          </p:cNvPicPr>
+          <p:nvPr/>
+        </p:nvPicPr>
+        <p:blipFill>
+          <a:blip r:embed="rId5"/>
+          <a:stretch>
+            <a:fillRect/>
+          </a:stretch>
+        </p:blipFill>
+        <p:spPr>
+          <a:xfrm>
+            <a:off x="3435177" y="5273114"/>
+            <a:ext cx="3838575" cy="1479596"/>
+          </a:xfrm>
+          <a:prstGeom prst="rect">
+            <a:avLst/>
+          </a:prstGeom>
+        </p:spPr>
+      </p:pic>
+      <p:sp>
+        <p:nvSpPr>
+          <p:cNvPr id="8" name="Rectangle 7"/>
+          <p:cNvSpPr/>
+          <p:nvPr/>
+        </p:nvSpPr>
+        <p:spPr>
+          <a:xfrm>
+            <a:off x="838200" y="4357816"/>
+            <a:ext cx="11197281" cy="2500184"/>
+          </a:xfrm>
+          <a:prstGeom prst="rect">
+            <a:avLst/>
+          </a:prstGeom>
+          <a:solidFill>
+            <a:schemeClr val="bg1"/>
+          </a:solidFill>
+          <a:ln>
+            <a:noFill/>
+          </a:ln>
+        </p:spPr>
+        <p:style>
+          <a:lnRef idx="2">
+            <a:schemeClr val="accent1">
+              <a:shade val="50000"/>
+            </a:schemeClr>
+          </a:lnRef>
+          <a:fillRef idx="1">
+            <a:schemeClr val="accent1"/>
+          </a:fillRef>
+          <a:effectRef idx="0">
+            <a:schemeClr val="accent1"/>
+          </a:effectRef>
+          <a:fontRef idx="minor">
+            <a:schemeClr val="lt1"/>
+          </a:fontRef>
+        </p:style>
+        <p:txBody>
+          <a:bodyPr rtlCol="0" anchor="ctr"/>
+          <a:lstStyle/>
+          <a:p>
+            <a:pPr algn="ctr"/>
+            <a:endParaRPr lang="en-US"/>
+          </a:p>
+        </p:txBody>
+      </p:sp>
+      <p:sp>
+        <p:nvSpPr>
+          <p:cNvPr id="2" name="Oval 1"/>
+          <p:cNvSpPr/>
+          <p:nvPr/>
+        </p:nvSpPr>
+        <p:spPr>
+          <a:xfrm>
+            <a:off x="7076304" y="2627870"/>
+            <a:ext cx="2001794" cy="1598055"/>
+          </a:xfrm>
+          <a:prstGeom prst="ellipse">
+            <a:avLst/>
+          </a:prstGeom>
+          <a:noFill/>
+          <a:ln w="38100">
+            <a:solidFill>
+              <a:srgbClr val="FF0000"/>
+            </a:solidFill>
+          </a:ln>
+        </p:spPr>
+        <p:style>
+          <a:lnRef idx="2">
+            <a:schemeClr val="accent1">
+              <a:shade val="50000"/>
+            </a:schemeClr>
+          </a:lnRef>
+          <a:fillRef idx="1">
+            <a:schemeClr val="accent1"/>
+          </a:fillRef>
+          <a:effectRef idx="0">
+            <a:schemeClr val="accent1"/>
+          </a:effectRef>
+          <a:fontRef idx="minor">
+            <a:schemeClr val="lt1"/>
+          </a:fontRef>
+        </p:style>
+        <p:txBody>
+          <a:bodyPr rtlCol="0" anchor="ctr"/>
+          <a:lstStyle/>
+          <a:p>
+            <a:pPr algn="ctr"/>
+            <a:endParaRPr lang="en-US"/>
+          </a:p>
+        </p:txBody>
+      </p:sp>
+    </p:spTree>
+    <p:extLst>
+      <p:ext uri="{BB962C8B-B14F-4D97-AF65-F5344CB8AC3E}">
+        <p14:creationId xmlns:p14="http://schemas.microsoft.com/office/powerpoint/2010/main" val="3140644432"/>
+      </p:ext>
+    </p:extLst>
+  </p:cSld>
+  <p:clrMapOvr>
+    <a:masterClrMapping/>
+  </p:clrMapOvr>
+</p:sld>
+</file>
+
+<file path=ppt/slides/slide14.xml><?xml version="1.0" encoding="utf-8"?>
+<p:sld xmlns:a="http://schemas.openxmlformats.org/drawingml/2006/main" xmlns:r="http://schemas.openxmlformats.org/officeDocument/2006/relationships" xmlns:p="http://schemas.openxmlformats.org/presentationml/2006/main">
+  <p:cSld>
+    <p:spTree>
+      <p:nvGrpSpPr>
+        <p:cNvPr id="1" name=""/>
+        <p:cNvGrpSpPr/>
+        <p:nvPr/>
+      </p:nvGrpSpPr>
+      <p:grpSpPr>
+        <a:xfrm>
+          <a:off x="0" y="0"/>
+          <a:ext cx="0" cy="0"/>
+          <a:chOff x="0" y="0"/>
+          <a:chExt cx="0" cy="0"/>
+        </a:xfrm>
+      </p:grpSpPr>
+      <p:sp>
+        <p:nvSpPr>
+          <p:cNvPr id="3" name="Content Placeholder 2"/>
+          <p:cNvSpPr>
+            <a:spLocks noGrp="1"/>
+          </p:cNvSpPr>
+          <p:nvPr>
+            <p:ph idx="1"/>
+          </p:nvPr>
+        </p:nvSpPr>
+        <p:spPr/>
+        <p:txBody>
+          <a:bodyPr>
+            <a:normAutofit lnSpcReduction="10000"/>
+          </a:bodyPr>
+          <a:lstStyle/>
+          <a:p>
+            <a:pPr marL="0" indent="0">
+              <a:buNone/>
+            </a:pPr>
+            <a:r>
+              <a:rPr lang="en-US" dirty="0" err="1"/>
+              <a:t>d</a:t>
+            </a:r>
+            <a:r>
+              <a:rPr lang="en-US" dirty="0" err="1" smtClean="0"/>
+              <a:t>at</a:t>
+            </a:r>
+            <a:r>
+              <a:rPr lang="en-US" dirty="0" smtClean="0"/>
+              <a:t> %&gt;%</a:t>
+            </a:r>
+          </a:p>
+          <a:p>
+            <a:pPr marL="0" indent="0">
+              <a:buNone/>
+            </a:pPr>
+            <a:endParaRPr lang="en-US" dirty="0" smtClean="0"/>
+          </a:p>
+          <a:p>
+            <a:pPr marL="0" indent="0">
+              <a:buNone/>
+            </a:pPr>
+            <a:r>
+              <a:rPr lang="en-US" dirty="0" smtClean="0"/>
+              <a:t>	</a:t>
+            </a:r>
+            <a:r>
+              <a:rPr lang="en-US" dirty="0" err="1" smtClean="0"/>
+              <a:t>group_by</a:t>
+            </a:r>
+            <a:r>
+              <a:rPr lang="en-US" dirty="0" smtClean="0"/>
+              <a:t>(crop, </a:t>
+            </a:r>
+            <a:r>
+              <a:rPr lang="en-US" dirty="0" err="1" smtClean="0"/>
+              <a:t>pos</a:t>
+            </a:r>
+            <a:r>
+              <a:rPr lang="en-US" dirty="0" smtClean="0"/>
+              <a:t>) %&gt;%</a:t>
+            </a:r>
+          </a:p>
+          <a:p>
+            <a:pPr marL="0" indent="0">
+              <a:buNone/>
+            </a:pPr>
+            <a:endParaRPr lang="en-US" dirty="0" smtClean="0"/>
+          </a:p>
+          <a:p>
+            <a:pPr marL="0" indent="0">
+              <a:buNone/>
+            </a:pPr>
+            <a:r>
+              <a:rPr lang="en-US" dirty="0"/>
+              <a:t> </a:t>
+            </a:r>
+            <a:r>
+              <a:rPr lang="en-US" dirty="0" smtClean="0"/>
+              <a:t>  	nest() %&gt;%</a:t>
+            </a:r>
+          </a:p>
+          <a:p>
+            <a:pPr marL="0" indent="0">
+              <a:buNone/>
+            </a:pPr>
+            <a:endParaRPr lang="en-US" dirty="0" smtClean="0"/>
+          </a:p>
+          <a:p>
+            <a:pPr marL="0" indent="0">
+              <a:buNone/>
+            </a:pPr>
+            <a:r>
+              <a:rPr lang="en-US" dirty="0"/>
+              <a:t>	</a:t>
+            </a:r>
+            <a:r>
+              <a:rPr lang="en-US" dirty="0" smtClean="0"/>
+              <a:t>mutate( </a:t>
+            </a:r>
+            <a:r>
+              <a:rPr lang="en-US" dirty="0" err="1" smtClean="0"/>
+              <a:t>efit</a:t>
+            </a:r>
+            <a:r>
+              <a:rPr lang="en-US" dirty="0" smtClean="0"/>
+              <a:t> = map(data, </a:t>
+            </a:r>
+            <a:r>
+              <a:rPr lang="en-US" dirty="0" err="1" smtClean="0"/>
+              <a:t>myfun</a:t>
+            </a:r>
+            <a:r>
+              <a:rPr lang="en-US" dirty="0" smtClean="0"/>
+              <a:t>)) %&gt;%</a:t>
+            </a:r>
+          </a:p>
+          <a:p>
+            <a:pPr marL="0" indent="0">
+              <a:buNone/>
+            </a:pPr>
+            <a:endParaRPr lang="en-US" dirty="0" smtClean="0"/>
+          </a:p>
+          <a:p>
+            <a:pPr marL="0" indent="0">
+              <a:buNone/>
+            </a:pPr>
+            <a:r>
+              <a:rPr lang="en-US" dirty="0"/>
+              <a:t>	</a:t>
+            </a:r>
+            <a:r>
+              <a:rPr lang="en-US" dirty="0" err="1" smtClean="0"/>
+              <a:t>unnest</a:t>
+            </a:r>
+            <a:r>
+              <a:rPr lang="en-US" dirty="0" smtClean="0"/>
+              <a:t>()</a:t>
+            </a:r>
+            <a:endParaRPr lang="en-US" dirty="0"/>
+          </a:p>
+        </p:txBody>
+      </p:sp>
+      <p:pic>
+        <p:nvPicPr>
+          <p:cNvPr id="4" name="Picture 3"/>
+          <p:cNvPicPr>
+            <a:picLocks noChangeAspect="1"/>
+          </p:cNvPicPr>
+          <p:nvPr/>
+        </p:nvPicPr>
+        <p:blipFill>
+          <a:blip r:embed="rId2"/>
+          <a:stretch>
+            <a:fillRect/>
+          </a:stretch>
+        </p:blipFill>
+        <p:spPr>
+          <a:xfrm>
+            <a:off x="2422439" y="152915"/>
+            <a:ext cx="4381500" cy="2400300"/>
+          </a:xfrm>
+          <a:prstGeom prst="rect">
+            <a:avLst/>
+          </a:prstGeom>
+        </p:spPr>
+      </p:pic>
+      <p:pic>
+        <p:nvPicPr>
+          <p:cNvPr id="5" name="Picture 4"/>
+          <p:cNvPicPr>
+            <a:picLocks noChangeAspect="1"/>
+          </p:cNvPicPr>
+          <p:nvPr/>
+        </p:nvPicPr>
+        <p:blipFill>
+          <a:blip r:embed="rId3"/>
+          <a:stretch>
+            <a:fillRect/>
+          </a:stretch>
+        </p:blipFill>
+        <p:spPr>
+          <a:xfrm>
+            <a:off x="6096000" y="2759075"/>
+            <a:ext cx="3095625" cy="1466850"/>
+          </a:xfrm>
+          <a:prstGeom prst="rect">
+            <a:avLst/>
+          </a:prstGeom>
+        </p:spPr>
+      </p:pic>
+      <p:pic>
+        <p:nvPicPr>
+          <p:cNvPr id="6" name="Picture 5"/>
+          <p:cNvPicPr>
+            <a:picLocks noChangeAspect="1"/>
+          </p:cNvPicPr>
+          <p:nvPr/>
+        </p:nvPicPr>
+        <p:blipFill>
+          <a:blip r:embed="rId4"/>
+          <a:stretch>
+            <a:fillRect/>
+          </a:stretch>
+        </p:blipFill>
+        <p:spPr>
+          <a:xfrm>
+            <a:off x="7958651" y="4431785"/>
+            <a:ext cx="3752850" cy="1352550"/>
+          </a:xfrm>
+          <a:prstGeom prst="rect">
+            <a:avLst/>
+          </a:prstGeom>
+        </p:spPr>
+      </p:pic>
+      <p:pic>
+        <p:nvPicPr>
+          <p:cNvPr id="7" name="Picture 6"/>
+          <p:cNvPicPr>
+            <a:picLocks noChangeAspect="1"/>
+          </p:cNvPicPr>
+          <p:nvPr/>
+        </p:nvPicPr>
+        <p:blipFill>
+          <a:blip r:embed="rId5"/>
+          <a:stretch>
+            <a:fillRect/>
+          </a:stretch>
+        </p:blipFill>
+        <p:spPr>
+          <a:xfrm>
+            <a:off x="3435177" y="5273114"/>
+            <a:ext cx="3838575" cy="1479596"/>
+          </a:xfrm>
+          <a:prstGeom prst="rect">
+            <a:avLst/>
+          </a:prstGeom>
+        </p:spPr>
+      </p:pic>
+      <p:sp>
+        <p:nvSpPr>
+          <p:cNvPr id="8" name="Rectangle 7"/>
+          <p:cNvSpPr/>
+          <p:nvPr/>
+        </p:nvSpPr>
+        <p:spPr>
+          <a:xfrm>
+            <a:off x="838201" y="5159374"/>
+            <a:ext cx="6762750" cy="1698625"/>
+          </a:xfrm>
+          <a:prstGeom prst="rect">
+            <a:avLst/>
+          </a:prstGeom>
+          <a:solidFill>
+            <a:schemeClr val="bg1"/>
+          </a:solidFill>
+          <a:ln>
+            <a:noFill/>
+          </a:ln>
+        </p:spPr>
+        <p:style>
+          <a:lnRef idx="2">
+            <a:schemeClr val="accent1">
+              <a:shade val="50000"/>
+            </a:schemeClr>
+          </a:lnRef>
+          <a:fillRef idx="1">
+            <a:schemeClr val="accent1"/>
+          </a:fillRef>
+          <a:effectRef idx="0">
+            <a:schemeClr val="accent1"/>
+          </a:effectRef>
+          <a:fontRef idx="minor">
+            <a:schemeClr val="lt1"/>
+          </a:fontRef>
+        </p:style>
+        <p:txBody>
+          <a:bodyPr rtlCol="0" anchor="ctr"/>
+          <a:lstStyle/>
+          <a:p>
+            <a:pPr algn="ctr"/>
+            <a:endParaRPr lang="en-US"/>
+          </a:p>
+        </p:txBody>
+      </p:sp>
+      <p:sp>
+        <p:nvSpPr>
+          <p:cNvPr id="9" name="Oval 8"/>
+          <p:cNvSpPr/>
+          <p:nvPr/>
+        </p:nvSpPr>
+        <p:spPr>
+          <a:xfrm>
+            <a:off x="10651523" y="4360346"/>
+            <a:ext cx="1417677" cy="1598055"/>
+          </a:xfrm>
+          <a:prstGeom prst="ellipse">
+            <a:avLst/>
+          </a:prstGeom>
+          <a:noFill/>
+          <a:ln w="38100">
+            <a:solidFill>
+              <a:srgbClr val="FF0000"/>
+            </a:solidFill>
+          </a:ln>
+        </p:spPr>
+        <p:style>
+          <a:lnRef idx="2">
+            <a:schemeClr val="accent1">
+              <a:shade val="50000"/>
+            </a:schemeClr>
+          </a:lnRef>
+          <a:fillRef idx="1">
+            <a:schemeClr val="accent1"/>
+          </a:fillRef>
+          <a:effectRef idx="0">
+            <a:schemeClr val="accent1"/>
+          </a:effectRef>
+          <a:fontRef idx="minor">
+            <a:schemeClr val="lt1"/>
+          </a:fontRef>
+        </p:style>
+        <p:txBody>
+          <a:bodyPr rtlCol="0" anchor="ctr"/>
+          <a:lstStyle/>
+          <a:p>
+            <a:pPr algn="ctr"/>
+            <a:endParaRPr lang="en-US"/>
+          </a:p>
+        </p:txBody>
+      </p:sp>
+    </p:spTree>
+    <p:extLst>
+      <p:ext uri="{BB962C8B-B14F-4D97-AF65-F5344CB8AC3E}">
+        <p14:creationId xmlns:p14="http://schemas.microsoft.com/office/powerpoint/2010/main" val="3282604534"/>
+      </p:ext>
+    </p:extLst>
+  </p:cSld>
+  <p:clrMapOvr>
+    <a:masterClrMapping/>
+  </p:clrMapOvr>
+</p:sld>
+</file>
+
+<file path=ppt/slides/slide15.xml><?xml version="1.0" encoding="utf-8"?>
+<p:sld xmlns:a="http://schemas.openxmlformats.org/drawingml/2006/main" xmlns:r="http://schemas.openxmlformats.org/officeDocument/2006/relationships" xmlns:p="http://schemas.openxmlformats.org/presentationml/2006/main">
+  <p:cSld>
+    <p:spTree>
+      <p:nvGrpSpPr>
+        <p:cNvPr id="1" name=""/>
+        <p:cNvGrpSpPr/>
+        <p:nvPr/>
+      </p:nvGrpSpPr>
+      <p:grpSpPr>
+        <a:xfrm>
+          <a:off x="0" y="0"/>
+          <a:ext cx="0" cy="0"/>
+          <a:chOff x="0" y="0"/>
+          <a:chExt cx="0" cy="0"/>
+        </a:xfrm>
+      </p:grpSpPr>
+      <p:sp>
+        <p:nvSpPr>
+          <p:cNvPr id="3" name="Content Placeholder 2"/>
+          <p:cNvSpPr>
+            <a:spLocks noGrp="1"/>
+          </p:cNvSpPr>
+          <p:nvPr>
+            <p:ph idx="1"/>
+          </p:nvPr>
+        </p:nvSpPr>
+        <p:spPr/>
+        <p:txBody>
+          <a:bodyPr>
+            <a:normAutofit lnSpcReduction="10000"/>
+          </a:bodyPr>
+          <a:lstStyle/>
+          <a:p>
+            <a:pPr marL="0" indent="0">
+              <a:buNone/>
+            </a:pPr>
+            <a:r>
+              <a:rPr lang="en-US" dirty="0" err="1"/>
+              <a:t>d</a:t>
+            </a:r>
+            <a:r>
+              <a:rPr lang="en-US" dirty="0" err="1" smtClean="0"/>
+              <a:t>at</a:t>
+            </a:r>
+            <a:r>
+              <a:rPr lang="en-US" dirty="0" smtClean="0"/>
+              <a:t> %&gt;%</a:t>
+            </a:r>
+          </a:p>
+          <a:p>
+            <a:pPr marL="0" indent="0">
+              <a:buNone/>
+            </a:pPr>
+            <a:endParaRPr lang="en-US" dirty="0" smtClean="0"/>
+          </a:p>
+          <a:p>
+            <a:pPr marL="0" indent="0">
+              <a:buNone/>
+            </a:pPr>
+            <a:r>
+              <a:rPr lang="en-US" dirty="0" smtClean="0"/>
+              <a:t>	</a:t>
+            </a:r>
+            <a:r>
+              <a:rPr lang="en-US" dirty="0" err="1" smtClean="0"/>
+              <a:t>group_by</a:t>
+            </a:r>
+            <a:r>
+              <a:rPr lang="en-US" dirty="0" smtClean="0"/>
+              <a:t>(crop, </a:t>
+            </a:r>
+            <a:r>
+              <a:rPr lang="en-US" dirty="0" err="1" smtClean="0"/>
+              <a:t>pos</a:t>
+            </a:r>
+            <a:r>
+              <a:rPr lang="en-US" dirty="0" smtClean="0"/>
+              <a:t>) %&gt;%</a:t>
+            </a:r>
+          </a:p>
+          <a:p>
+            <a:pPr marL="0" indent="0">
+              <a:buNone/>
+            </a:pPr>
+            <a:endParaRPr lang="en-US" dirty="0" smtClean="0"/>
+          </a:p>
+          <a:p>
+            <a:pPr marL="0" indent="0">
+              <a:buNone/>
+            </a:pPr>
+            <a:r>
+              <a:rPr lang="en-US" dirty="0"/>
+              <a:t> </a:t>
+            </a:r>
+            <a:r>
+              <a:rPr lang="en-US" dirty="0" smtClean="0"/>
+              <a:t>  	nest() %&gt;%</a:t>
+            </a:r>
+          </a:p>
+          <a:p>
+            <a:pPr marL="0" indent="0">
+              <a:buNone/>
+            </a:pPr>
+            <a:endParaRPr lang="en-US" dirty="0" smtClean="0"/>
+          </a:p>
+          <a:p>
+            <a:pPr marL="0" indent="0">
+              <a:buNone/>
+            </a:pPr>
+            <a:r>
+              <a:rPr lang="en-US" dirty="0"/>
+              <a:t>	</a:t>
+            </a:r>
+            <a:r>
+              <a:rPr lang="en-US" dirty="0" smtClean="0"/>
+              <a:t>mutate( </a:t>
+            </a:r>
+            <a:r>
+              <a:rPr lang="en-US" dirty="0" err="1" smtClean="0"/>
+              <a:t>efit</a:t>
+            </a:r>
+            <a:r>
+              <a:rPr lang="en-US" dirty="0" smtClean="0"/>
+              <a:t> = map(data, </a:t>
+            </a:r>
+            <a:r>
+              <a:rPr lang="en-US" dirty="0" err="1" smtClean="0"/>
+              <a:t>myfun</a:t>
+            </a:r>
+            <a:r>
+              <a:rPr lang="en-US" dirty="0" smtClean="0"/>
+              <a:t>)) %&gt;%</a:t>
+            </a:r>
+          </a:p>
+          <a:p>
+            <a:pPr marL="0" indent="0">
+              <a:buNone/>
+            </a:pPr>
+            <a:endParaRPr lang="en-US" dirty="0" smtClean="0"/>
+          </a:p>
+          <a:p>
+            <a:pPr marL="0" indent="0">
+              <a:buNone/>
+            </a:pPr>
+            <a:r>
+              <a:rPr lang="en-US" dirty="0"/>
+              <a:t>	</a:t>
+            </a:r>
+            <a:r>
+              <a:rPr lang="en-US" dirty="0" err="1" smtClean="0"/>
+              <a:t>unnest</a:t>
+            </a:r>
+            <a:r>
+              <a:rPr lang="en-US" dirty="0" smtClean="0"/>
+              <a:t>()</a:t>
+            </a:r>
+            <a:endParaRPr lang="en-US" dirty="0"/>
+          </a:p>
+        </p:txBody>
+      </p:sp>
+      <p:pic>
+        <p:nvPicPr>
+          <p:cNvPr id="4" name="Picture 3"/>
+          <p:cNvPicPr>
+            <a:picLocks noChangeAspect="1"/>
+          </p:cNvPicPr>
+          <p:nvPr/>
+        </p:nvPicPr>
+        <p:blipFill>
+          <a:blip r:embed="rId2"/>
+          <a:stretch>
+            <a:fillRect/>
+          </a:stretch>
+        </p:blipFill>
+        <p:spPr>
+          <a:xfrm>
+            <a:off x="2422439" y="152915"/>
+            <a:ext cx="4381500" cy="2400300"/>
+          </a:xfrm>
+          <a:prstGeom prst="rect">
+            <a:avLst/>
+          </a:prstGeom>
+        </p:spPr>
+      </p:pic>
+      <p:pic>
+        <p:nvPicPr>
+          <p:cNvPr id="5" name="Picture 4"/>
+          <p:cNvPicPr>
+            <a:picLocks noChangeAspect="1"/>
+          </p:cNvPicPr>
+          <p:nvPr/>
+        </p:nvPicPr>
+        <p:blipFill>
+          <a:blip r:embed="rId3"/>
+          <a:stretch>
+            <a:fillRect/>
+          </a:stretch>
+        </p:blipFill>
+        <p:spPr>
+          <a:xfrm>
+            <a:off x="6096000" y="2759075"/>
+            <a:ext cx="3095625" cy="1466850"/>
+          </a:xfrm>
+          <a:prstGeom prst="rect">
+            <a:avLst/>
+          </a:prstGeom>
+        </p:spPr>
+      </p:pic>
+      <p:pic>
+        <p:nvPicPr>
+          <p:cNvPr id="6" name="Picture 5"/>
+          <p:cNvPicPr>
+            <a:picLocks noChangeAspect="1"/>
+          </p:cNvPicPr>
+          <p:nvPr/>
+        </p:nvPicPr>
+        <p:blipFill>
+          <a:blip r:embed="rId4"/>
+          <a:stretch>
+            <a:fillRect/>
+          </a:stretch>
+        </p:blipFill>
+        <p:spPr>
+          <a:xfrm>
+            <a:off x="7958651" y="4431785"/>
+            <a:ext cx="3752850" cy="1352550"/>
+          </a:xfrm>
+          <a:prstGeom prst="rect">
+            <a:avLst/>
+          </a:prstGeom>
+        </p:spPr>
+      </p:pic>
+      <p:pic>
+        <p:nvPicPr>
+          <p:cNvPr id="7" name="Picture 6"/>
+          <p:cNvPicPr>
+            <a:picLocks noChangeAspect="1"/>
+          </p:cNvPicPr>
+          <p:nvPr/>
+        </p:nvPicPr>
+        <p:blipFill>
+          <a:blip r:embed="rId5"/>
+          <a:stretch>
+            <a:fillRect/>
+          </a:stretch>
+        </p:blipFill>
+        <p:spPr>
+          <a:xfrm>
+            <a:off x="3435177" y="5273114"/>
+            <a:ext cx="3838575" cy="1479596"/>
+          </a:xfrm>
+          <a:prstGeom prst="rect">
+            <a:avLst/>
+          </a:prstGeom>
+        </p:spPr>
+      </p:pic>
+    </p:spTree>
+    <p:extLst>
+      <p:ext uri="{BB962C8B-B14F-4D97-AF65-F5344CB8AC3E}">
+        <p14:creationId xmlns:p14="http://schemas.microsoft.com/office/powerpoint/2010/main" val="4155953837"/>
+      </p:ext>
+    </p:extLst>
+  </p:cSld>
+  <p:clrMapOvr>
+    <a:masterClrMapping/>
+  </p:clrMapOvr>
+</p:sld>
+</file>
+
+<file path=ppt/slides/slide16.xml><?xml version="1.0" encoding="utf-8"?>
+<p:sld xmlns:a="http://schemas.openxmlformats.org/drawingml/2006/main" xmlns:r="http://schemas.openxmlformats.org/officeDocument/2006/relationships" xmlns:p="http://schemas.openxmlformats.org/presentationml/2006/main">
+  <p:cSld>
+    <p:spTree>
+      <p:nvGrpSpPr>
+        <p:cNvPr id="1" name=""/>
+        <p:cNvGrpSpPr/>
+        <p:nvPr/>
+      </p:nvGrpSpPr>
+      <p:grpSpPr>
+        <a:xfrm>
+          <a:off x="0" y="0"/>
+          <a:ext cx="0" cy="0"/>
+          <a:chOff x="0" y="0"/>
+          <a:chExt cx="0" cy="0"/>
+        </a:xfrm>
+      </p:grpSpPr>
+      <p:pic>
+        <p:nvPicPr>
+          <p:cNvPr id="4" name="Picture 3"/>
+          <p:cNvPicPr>
+            <a:picLocks noChangeAspect="1"/>
+          </p:cNvPicPr>
+          <p:nvPr/>
+        </p:nvPicPr>
+        <p:blipFill>
+          <a:blip r:embed="rId2"/>
+          <a:stretch>
+            <a:fillRect/>
+          </a:stretch>
+        </p:blipFill>
+        <p:spPr>
+          <a:xfrm>
+            <a:off x="7628238" y="536490"/>
+            <a:ext cx="3875515" cy="4522800"/>
+          </a:xfrm>
+          <a:prstGeom prst="rect">
+            <a:avLst/>
+          </a:prstGeom>
+        </p:spPr>
+      </p:pic>
+      <p:sp>
+        <p:nvSpPr>
+          <p:cNvPr id="2" name="Title 1"/>
+          <p:cNvSpPr>
+            <a:spLocks noGrp="1"/>
+          </p:cNvSpPr>
+          <p:nvPr>
+            <p:ph type="title"/>
+          </p:nvPr>
+        </p:nvSpPr>
+        <p:spPr/>
+        <p:txBody>
+          <a:bodyPr/>
+          <a:lstStyle/>
+          <a:p>
+            <a:r>
+              <a:rPr lang="en-US" dirty="0" err="1" smtClean="0"/>
+              <a:t>purrr</a:t>
+            </a:r>
+            <a:r>
+              <a:rPr lang="en-US" dirty="0" smtClean="0"/>
+              <a:t> package</a:t>
+            </a:r>
+            <a:endParaRPr lang="en-US" dirty="0"/>
+          </a:p>
+        </p:txBody>
+      </p:sp>
+      <p:sp>
+        <p:nvSpPr>
+          <p:cNvPr id="3" name="Content Placeholder 2"/>
+          <p:cNvSpPr>
+            <a:spLocks noGrp="1"/>
+          </p:cNvSpPr>
+          <p:nvPr>
+            <p:ph idx="1"/>
+          </p:nvPr>
+        </p:nvSpPr>
+        <p:spPr/>
+        <p:txBody>
+          <a:bodyPr/>
+          <a:lstStyle/>
+          <a:p>
+            <a:r>
+              <a:rPr lang="en-US" dirty="0" smtClean="0"/>
+              <a:t>Chapter 17 of R4DS book</a:t>
+            </a:r>
+          </a:p>
+          <a:p>
+            <a:r>
+              <a:rPr lang="en-US" dirty="0" smtClean="0"/>
+              <a:t>Great </a:t>
+            </a:r>
+            <a:r>
+              <a:rPr lang="en-US" dirty="0" err="1" smtClean="0"/>
+              <a:t>cheatsheet</a:t>
+            </a:r>
+            <a:endParaRPr lang="en-US" dirty="0" smtClean="0"/>
+          </a:p>
+          <a:p>
+            <a:r>
+              <a:rPr lang="en-US" dirty="0"/>
+              <a:t>https://www.rstudio.com/resources/cheatsheets/</a:t>
+            </a:r>
+            <a:endParaRPr lang="en-US" dirty="0" smtClean="0"/>
+          </a:p>
+          <a:p>
+            <a:endParaRPr lang="en-US" dirty="0"/>
+          </a:p>
+        </p:txBody>
+      </p:sp>
+      <p:pic>
+        <p:nvPicPr>
+          <p:cNvPr id="5" name="Picture 4"/>
+          <p:cNvPicPr>
+            <a:picLocks noChangeAspect="1"/>
+          </p:cNvPicPr>
+          <p:nvPr/>
+        </p:nvPicPr>
+        <p:blipFill>
+          <a:blip r:embed="rId3"/>
+          <a:stretch>
+            <a:fillRect/>
+          </a:stretch>
+        </p:blipFill>
+        <p:spPr>
+          <a:xfrm>
+            <a:off x="1224606" y="3707714"/>
+            <a:ext cx="4552950" cy="2324100"/>
+          </a:xfrm>
+          <a:prstGeom prst="rect">
+            <a:avLst/>
+          </a:prstGeom>
+        </p:spPr>
+      </p:pic>
+    </p:spTree>
+    <p:extLst>
+      <p:ext uri="{BB962C8B-B14F-4D97-AF65-F5344CB8AC3E}">
+        <p14:creationId xmlns:p14="http://schemas.microsoft.com/office/powerpoint/2010/main" val="1125979336"/>
+      </p:ext>
+    </p:extLst>
+  </p:cSld>
+  <p:clrMapOvr>
+    <a:masterClrMapping/>
+  </p:clrMapOvr>
+</p:sld>
+</file>
+
+<file path=ppt/slides/slide17.xml><?xml version="1.0" encoding="utf-8"?>
+<p:sld xmlns:a="http://schemas.openxmlformats.org/drawingml/2006/main" xmlns:r="http://schemas.openxmlformats.org/officeDocument/2006/relationships" xmlns:p="http://schemas.openxmlformats.org/presentationml/2006/main">
+  <p:cSld>
+    <p:spTree>
+      <p:nvGrpSpPr>
+        <p:cNvPr id="1" name=""/>
+        <p:cNvGrpSpPr/>
+        <p:nvPr/>
+      </p:nvGrpSpPr>
+      <p:grpSpPr>
+        <a:xfrm>
+          <a:off x="0" y="0"/>
+          <a:ext cx="0" cy="0"/>
+          <a:chOff x="0" y="0"/>
+          <a:chExt cx="0" cy="0"/>
+        </a:xfrm>
+      </p:grpSpPr>
+      <p:sp>
+        <p:nvSpPr>
+          <p:cNvPr id="2" name="Title 1"/>
+          <p:cNvSpPr>
+            <a:spLocks noGrp="1"/>
+          </p:cNvSpPr>
+          <p:nvPr>
+            <p:ph type="title"/>
+          </p:nvPr>
+        </p:nvSpPr>
+        <p:spPr/>
+        <p:txBody>
+          <a:bodyPr>
+            <a:normAutofit/>
+          </a:bodyPr>
+          <a:lstStyle/>
+          <a:p>
+            <a:r>
+              <a:rPr lang="en-US" dirty="0" err="1" smtClean="0"/>
+              <a:t>Felienne</a:t>
+            </a:r>
+            <a:endParaRPr lang="en-US" dirty="0"/>
+          </a:p>
+        </p:txBody>
+      </p:sp>
+      <p:sp>
+        <p:nvSpPr>
+          <p:cNvPr id="3" name="Content Placeholder 2"/>
+          <p:cNvSpPr>
+            <a:spLocks noGrp="1"/>
+          </p:cNvSpPr>
+          <p:nvPr>
+            <p:ph idx="1"/>
+          </p:nvPr>
+        </p:nvSpPr>
+        <p:spPr/>
+        <p:txBody>
+          <a:bodyPr/>
+          <a:lstStyle/>
+          <a:p>
+            <a:pPr marL="0" indent="0">
+              <a:buNone/>
+            </a:pPr>
+            <a:r>
+              <a:rPr lang="en-US" b="1" dirty="0">
+                <a:hlinkClick r:id="rId2"/>
+              </a:rPr>
+              <a:t>@</a:t>
+            </a:r>
+            <a:r>
+              <a:rPr lang="en-US" b="1" dirty="0" err="1">
+                <a:hlinkClick r:id="rId2"/>
+              </a:rPr>
+              <a:t>Felienne</a:t>
+            </a:r>
+            <a:endParaRPr lang="en-US" b="1" dirty="0"/>
+          </a:p>
+          <a:p>
+            <a:pPr marL="0" indent="0">
+              <a:buNone/>
+            </a:pPr>
+            <a:endParaRPr lang="en-US" dirty="0" smtClean="0"/>
+          </a:p>
+          <a:p>
+            <a:pPr marL="0" indent="0">
+              <a:buNone/>
+            </a:pPr>
+            <a:r>
+              <a:rPr lang="en-US" dirty="0" smtClean="0"/>
+              <a:t>Programmers can be snotty (Excel IS coding). </a:t>
+            </a:r>
+          </a:p>
+          <a:p>
+            <a:pPr marL="0" indent="0">
+              <a:buNone/>
+            </a:pPr>
+            <a:r>
+              <a:rPr lang="en-US" dirty="0"/>
+              <a:t>We have no idea how to teach coding. </a:t>
+            </a:r>
+          </a:p>
+          <a:p>
+            <a:pPr marL="0" indent="0">
+              <a:buNone/>
+            </a:pPr>
+            <a:r>
+              <a:rPr lang="en-US" dirty="0" smtClean="0"/>
+              <a:t>Exploratory learning in coding doesn’t work. </a:t>
+            </a:r>
+          </a:p>
+          <a:p>
+            <a:pPr marL="0" indent="0">
+              <a:buNone/>
+            </a:pPr>
+            <a:r>
+              <a:rPr lang="en-US" dirty="0" smtClean="0"/>
+              <a:t>Making you read your code out loud helps you learn it better</a:t>
+            </a:r>
+            <a:endParaRPr lang="en-US" dirty="0"/>
+          </a:p>
+        </p:txBody>
+      </p:sp>
+    </p:spTree>
+    <p:extLst>
+      <p:ext uri="{BB962C8B-B14F-4D97-AF65-F5344CB8AC3E}">
+        <p14:creationId xmlns:p14="http://schemas.microsoft.com/office/powerpoint/2010/main" val="3025562129"/>
+      </p:ext>
+    </p:extLst>
+  </p:cSld>
+  <p:clrMapOvr>
+    <a:masterClrMapping/>
+  </p:clrMapOvr>
+</p:sld>
+</file>
+
+<file path=ppt/slides/slide18.xml><?xml version="1.0" encoding="utf-8"?>
+<p:sld xmlns:a="http://schemas.openxmlformats.org/drawingml/2006/main" xmlns:r="http://schemas.openxmlformats.org/officeDocument/2006/relationships" xmlns:p="http://schemas.openxmlformats.org/presentationml/2006/main">
+  <p:cSld>
+    <p:spTree>
+      <p:nvGrpSpPr>
+        <p:cNvPr id="1" name=""/>
+        <p:cNvGrpSpPr/>
+        <p:nvPr/>
+      </p:nvGrpSpPr>
+      <p:grpSpPr>
+        <a:xfrm>
+          <a:off x="0" y="0"/>
+          <a:ext cx="0" cy="0"/>
+          <a:chOff x="0" y="0"/>
+          <a:chExt cx="0" cy="0"/>
+        </a:xfrm>
+      </p:grpSpPr>
+      <p:sp>
+        <p:nvSpPr>
+          <p:cNvPr id="2" name="Title 1"/>
+          <p:cNvSpPr>
+            <a:spLocks noGrp="1"/>
+          </p:cNvSpPr>
+          <p:nvPr>
+            <p:ph type="title"/>
+          </p:nvPr>
+        </p:nvSpPr>
+        <p:spPr/>
+        <p:txBody>
+          <a:bodyPr>
+            <a:normAutofit/>
+          </a:bodyPr>
+          <a:lstStyle/>
+          <a:p>
+            <a:r>
+              <a:rPr lang="en-US" dirty="0" smtClean="0"/>
+              <a:t>Brooke Watson, ACLU Analytics</a:t>
+            </a:r>
+            <a:endParaRPr lang="en-US" dirty="0"/>
+          </a:p>
+        </p:txBody>
+      </p:sp>
+      <p:sp>
+        <p:nvSpPr>
+          <p:cNvPr id="3" name="Content Placeholder 2"/>
+          <p:cNvSpPr>
+            <a:spLocks noGrp="1"/>
+          </p:cNvSpPr>
+          <p:nvPr>
+            <p:ph idx="1"/>
+          </p:nvPr>
+        </p:nvSpPr>
+        <p:spPr/>
+        <p:txBody>
+          <a:bodyPr/>
+          <a:lstStyle/>
+          <a:p>
+            <a:pPr marL="0" indent="0">
+              <a:buNone/>
+            </a:pPr>
+            <a:r>
+              <a:rPr lang="en-US" dirty="0" smtClean="0"/>
+              <a:t>The data we collect (and how we handle it) reflects our values</a:t>
+            </a:r>
+          </a:p>
+          <a:p>
+            <a:pPr marL="0" indent="0">
+              <a:buNone/>
+            </a:pPr>
+            <a:endParaRPr lang="en-US" dirty="0"/>
+          </a:p>
+          <a:p>
+            <a:pPr marL="0" indent="0">
+              <a:buNone/>
+            </a:pPr>
+            <a:r>
+              <a:rPr lang="en-US" dirty="0" smtClean="0"/>
+              <a:t>No central database to keep track of children separated from their parents at the border (?!?)</a:t>
+            </a:r>
+          </a:p>
+          <a:p>
+            <a:pPr marL="0" indent="0">
+              <a:buNone/>
+            </a:pPr>
+            <a:endParaRPr lang="en-US" dirty="0" smtClean="0"/>
+          </a:p>
+          <a:p>
+            <a:pPr marL="0" indent="0">
+              <a:buNone/>
+            </a:pPr>
+            <a:endParaRPr lang="en-US" dirty="0"/>
+          </a:p>
+        </p:txBody>
+      </p:sp>
+    </p:spTree>
+    <p:extLst>
+      <p:ext uri="{BB962C8B-B14F-4D97-AF65-F5344CB8AC3E}">
+        <p14:creationId xmlns:p14="http://schemas.microsoft.com/office/powerpoint/2010/main" val="4263579149"/>
+      </p:ext>
+    </p:extLst>
+  </p:cSld>
+  <p:clrMapOvr>
+    <a:masterClrMapping/>
+  </p:clrMapOvr>
+</p:sld>
+</file>
+
+<file path=ppt/slides/slide19.xml><?xml version="1.0" encoding="utf-8"?>
+<p:sld xmlns:a="http://schemas.openxmlformats.org/drawingml/2006/main" xmlns:r="http://schemas.openxmlformats.org/officeDocument/2006/relationships" xmlns:p="http://schemas.openxmlformats.org/presentationml/2006/main">
+  <p:cSld>
+    <p:spTree>
+      <p:nvGrpSpPr>
+        <p:cNvPr id="1" name=""/>
+        <p:cNvGrpSpPr/>
+        <p:nvPr/>
+      </p:nvGrpSpPr>
+      <p:grpSpPr>
+        <a:xfrm>
+          <a:off x="0" y="0"/>
+          <a:ext cx="0" cy="0"/>
+          <a:chOff x="0" y="0"/>
+          <a:chExt cx="0" cy="0"/>
+        </a:xfrm>
+      </p:grpSpPr>
+      <p:sp>
+        <p:nvSpPr>
+          <p:cNvPr id="6" name="Title 5"/>
+          <p:cNvSpPr>
+            <a:spLocks noGrp="1"/>
+          </p:cNvSpPr>
+          <p:nvPr>
+            <p:ph type="title"/>
+          </p:nvPr>
+        </p:nvSpPr>
+        <p:spPr/>
+        <p:txBody>
+          <a:bodyPr/>
+          <a:lstStyle/>
+          <a:p>
+            <a:r>
+              <a:rPr lang="en-US" dirty="0" smtClean="0"/>
+              <a:t>$500 for academics</a:t>
+            </a:r>
+            <a:endParaRPr lang="en-US" dirty="0"/>
+          </a:p>
+        </p:txBody>
+      </p:sp>
+      <p:sp>
+        <p:nvSpPr>
+          <p:cNvPr id="3" name="Content Placeholder 2"/>
+          <p:cNvSpPr>
+            <a:spLocks noGrp="1"/>
+          </p:cNvSpPr>
+          <p:nvPr>
+            <p:ph idx="4294967295"/>
+          </p:nvPr>
+        </p:nvSpPr>
+        <p:spPr>
+          <a:xfrm>
+            <a:off x="0" y="1825625"/>
+            <a:ext cx="10515600" cy="4351338"/>
+          </a:xfrm>
+        </p:spPr>
+        <p:txBody>
+          <a:bodyPr/>
+          <a:lstStyle/>
+          <a:p>
+            <a:pPr marL="0" indent="0">
+              <a:buNone/>
+            </a:pPr>
+            <a:endParaRPr lang="en-US" dirty="0" smtClean="0"/>
+          </a:p>
+          <a:p>
+            <a:pPr marL="0" indent="0">
+              <a:buNone/>
+            </a:pPr>
+            <a:endParaRPr lang="en-US" dirty="0"/>
+          </a:p>
+        </p:txBody>
+      </p:sp>
+      <p:pic>
+        <p:nvPicPr>
+          <p:cNvPr id="5" name="Picture 4"/>
+          <p:cNvPicPr>
+            <a:picLocks noChangeAspect="1"/>
+          </p:cNvPicPr>
+          <p:nvPr/>
+        </p:nvPicPr>
+        <p:blipFill rotWithShape="1">
+          <a:blip r:embed="rId2"/>
+          <a:srcRect r="50529"/>
+          <a:stretch/>
+        </p:blipFill>
+        <p:spPr>
+          <a:xfrm>
+            <a:off x="1977082" y="1413733"/>
+            <a:ext cx="7701922" cy="4865200"/>
+          </a:xfrm>
+          <a:prstGeom prst="rect">
+            <a:avLst/>
+          </a:prstGeom>
+        </p:spPr>
+      </p:pic>
+    </p:spTree>
+    <p:extLst>
+      <p:ext uri="{BB962C8B-B14F-4D97-AF65-F5344CB8AC3E}">
+        <p14:creationId xmlns:p14="http://schemas.microsoft.com/office/powerpoint/2010/main" val="3509103729"/>
       </p:ext>
     </p:extLst>
   </p:cSld>
@@ -3327,6 +5765,127 @@
           <a:lstStyle/>
           <a:p>
             <a:r>
+              <a:rPr lang="en-US" dirty="0" smtClean="0"/>
+              <a:t>Have you drank the </a:t>
+            </a:r>
+            <a:r>
+              <a:rPr lang="en-US" dirty="0" err="1" smtClean="0"/>
+              <a:t>tidyverse</a:t>
+            </a:r>
+            <a:r>
+              <a:rPr lang="en-US" dirty="0" smtClean="0"/>
+              <a:t> </a:t>
+            </a:r>
+            <a:r>
+              <a:rPr lang="en-US" dirty="0" err="1" smtClean="0"/>
+              <a:t>Koolaid</a:t>
+            </a:r>
+            <a:r>
+              <a:rPr lang="en-US" dirty="0" smtClean="0"/>
+              <a:t>?</a:t>
+            </a:r>
+            <a:endParaRPr lang="en-US" dirty="0"/>
+          </a:p>
+        </p:txBody>
+      </p:sp>
+      <p:sp>
+        <p:nvSpPr>
+          <p:cNvPr id="3" name="Content Placeholder 2"/>
+          <p:cNvSpPr>
+            <a:spLocks noGrp="1"/>
+          </p:cNvSpPr>
+          <p:nvPr>
+            <p:ph idx="1"/>
+          </p:nvPr>
+        </p:nvSpPr>
+        <p:spPr/>
+        <p:txBody>
+          <a:bodyPr/>
+          <a:lstStyle/>
+          <a:p>
+            <a:r>
+              <a:rPr lang="en-US" dirty="0" smtClean="0"/>
+              <a:t>You should. </a:t>
+            </a:r>
+          </a:p>
+        </p:txBody>
+      </p:sp>
+      <p:pic>
+        <p:nvPicPr>
+          <p:cNvPr id="4" name="Picture 3"/>
+          <p:cNvPicPr>
+            <a:picLocks noChangeAspect="1"/>
+          </p:cNvPicPr>
+          <p:nvPr/>
+        </p:nvPicPr>
+        <p:blipFill>
+          <a:blip r:embed="rId2">
+            <a:extLst>
+              <a:ext uri="{28A0092B-C50C-407E-A947-70E740481C1C}">
+                <a14:useLocalDpi xmlns:a14="http://schemas.microsoft.com/office/drawing/2010/main" val="0"/>
+              </a:ext>
+            </a:extLst>
+          </a:blip>
+          <a:stretch>
+            <a:fillRect/>
+          </a:stretch>
+        </p:blipFill>
+        <p:spPr>
+          <a:xfrm>
+            <a:off x="6456405" y="1911178"/>
+            <a:ext cx="3810000" cy="3810000"/>
+          </a:xfrm>
+          <a:prstGeom prst="rect">
+            <a:avLst/>
+          </a:prstGeom>
+        </p:spPr>
+      </p:pic>
+    </p:spTree>
+    <p:extLst>
+      <p:ext uri="{BB962C8B-B14F-4D97-AF65-F5344CB8AC3E}">
+        <p14:creationId xmlns:p14="http://schemas.microsoft.com/office/powerpoint/2010/main" val="254628364"/>
+      </p:ext>
+    </p:extLst>
+  </p:cSld>
+  <p:clrMapOvr>
+    <a:masterClrMapping/>
+  </p:clrMapOvr>
+</p:sld>
+</file>
+
+<file path=ppt/slides/slide5.xml><?xml version="1.0" encoding="utf-8"?>
+<p:sld xmlns:a="http://schemas.openxmlformats.org/drawingml/2006/main" xmlns:r="http://schemas.openxmlformats.org/officeDocument/2006/relationships" xmlns:p="http://schemas.openxmlformats.org/presentationml/2006/main">
+  <p:cSld>
+    <p:spTree>
+      <p:nvGrpSpPr>
+        <p:cNvPr id="1" name=""/>
+        <p:cNvGrpSpPr/>
+        <p:nvPr/>
+      </p:nvGrpSpPr>
+      <p:grpSpPr>
+        <a:xfrm>
+          <a:off x="0" y="0"/>
+          <a:ext cx="0" cy="0"/>
+          <a:chOff x="0" y="0"/>
+          <a:chExt cx="0" cy="0"/>
+        </a:xfrm>
+      </p:grpSpPr>
+      <p:sp>
+        <p:nvSpPr>
+          <p:cNvPr id="2" name="Title 1"/>
+          <p:cNvSpPr>
+            <a:spLocks noGrp="1"/>
+          </p:cNvSpPr>
+          <p:nvPr>
+            <p:ph type="title"/>
+          </p:nvPr>
+        </p:nvSpPr>
+        <p:spPr/>
+        <p:txBody>
+          <a:bodyPr/>
+          <a:lstStyle/>
+          <a:p>
+            <a:r>
               <a:rPr lang="en-US" dirty="0" err="1" smtClean="0"/>
               <a:t>rstudio</a:t>
             </a:r>
@@ -3419,200 +5978,6 @@
 </p:sld>
 </file>
 
-<file path=ppt/slides/slide5.xml><?xml version="1.0" encoding="utf-8"?>
-<p:sld xmlns:a="http://schemas.openxmlformats.org/drawingml/2006/main" xmlns:r="http://schemas.openxmlformats.org/officeDocument/2006/relationships" xmlns:p="http://schemas.openxmlformats.org/presentationml/2006/main">
-  <p:cSld>
-    <p:spTree>
-      <p:nvGrpSpPr>
-        <p:cNvPr id="1" name=""/>
-        <p:cNvGrpSpPr/>
-        <p:nvPr/>
-      </p:nvGrpSpPr>
-      <p:grpSpPr>
-        <a:xfrm>
-          <a:off x="0" y="0"/>
-          <a:ext cx="0" cy="0"/>
-          <a:chOff x="0" y="0"/>
-          <a:chExt cx="0" cy="0"/>
-        </a:xfrm>
-      </p:grpSpPr>
-      <p:sp>
-        <p:nvSpPr>
-          <p:cNvPr id="2" name="Title 1"/>
-          <p:cNvSpPr>
-            <a:spLocks noGrp="1"/>
-          </p:cNvSpPr>
-          <p:nvPr>
-            <p:ph type="title"/>
-          </p:nvPr>
-        </p:nvSpPr>
-        <p:spPr/>
-        <p:txBody>
-          <a:bodyPr/>
-          <a:lstStyle/>
-          <a:p>
-            <a:endParaRPr lang="en-US"/>
-          </a:p>
-        </p:txBody>
-      </p:sp>
-      <p:sp>
-        <p:nvSpPr>
-          <p:cNvPr id="3" name="Content Placeholder 2"/>
-          <p:cNvSpPr>
-            <a:spLocks noGrp="1"/>
-          </p:cNvSpPr>
-          <p:nvPr>
-            <p:ph idx="1"/>
-          </p:nvPr>
-        </p:nvSpPr>
-        <p:spPr/>
-        <p:txBody>
-          <a:bodyPr>
-            <a:normAutofit lnSpcReduction="10000"/>
-          </a:bodyPr>
-          <a:lstStyle/>
-          <a:p>
-            <a:r>
-              <a:rPr lang="en-US" dirty="0" err="1" smtClean="0">
-                <a:solidFill>
-                  <a:srgbClr val="FF0000"/>
-                </a:solidFill>
-              </a:rPr>
-              <a:t>gt</a:t>
-            </a:r>
-            <a:r>
-              <a:rPr lang="en-US" dirty="0" smtClean="0"/>
-              <a:t> package for tables</a:t>
-            </a:r>
-          </a:p>
-          <a:p>
-            <a:r>
-              <a:rPr lang="en-US" dirty="0" err="1">
-                <a:solidFill>
-                  <a:srgbClr val="FF0000"/>
-                </a:solidFill>
-              </a:rPr>
-              <a:t>gganimate</a:t>
-            </a:r>
-            <a:r>
-              <a:rPr lang="en-US" dirty="0" smtClean="0"/>
-              <a:t> for moving figures (updated package is completely different from old one, and is on CRAN)</a:t>
-            </a:r>
-          </a:p>
-          <a:p>
-            <a:r>
-              <a:rPr lang="en-US" dirty="0">
-                <a:solidFill>
-                  <a:srgbClr val="FF0000"/>
-                </a:solidFill>
-              </a:rPr>
-              <a:t>here</a:t>
-            </a:r>
-            <a:r>
-              <a:rPr lang="en-US" dirty="0" smtClean="0"/>
-              <a:t> package for working directory things</a:t>
-            </a:r>
-            <a:endParaRPr lang="en-US" dirty="0">
-              <a:solidFill>
-                <a:srgbClr val="FF0000"/>
-              </a:solidFill>
-            </a:endParaRPr>
-          </a:p>
-          <a:p>
-            <a:pPr marL="0" indent="0">
-              <a:buNone/>
-            </a:pPr>
-            <a:r>
-              <a:rPr lang="en-US" sz="2400" dirty="0" smtClean="0"/>
-              <a:t>https://malco.io/2018/11/05/why-should-i-use-the-here-package/</a:t>
-            </a:r>
-          </a:p>
-          <a:p>
-            <a:r>
-              <a:rPr lang="en-US" dirty="0" err="1">
-                <a:solidFill>
-                  <a:srgbClr val="FF0000"/>
-                </a:solidFill>
-              </a:rPr>
-              <a:t>tidymodels</a:t>
-            </a:r>
-            <a:r>
-              <a:rPr lang="en-US" dirty="0" smtClean="0"/>
-              <a:t> package</a:t>
-            </a:r>
-          </a:p>
-          <a:p>
-            <a:pPr lvl="1"/>
-            <a:r>
-              <a:rPr lang="en-US" dirty="0" smtClean="0"/>
-              <a:t>Akin to the </a:t>
-            </a:r>
-            <a:r>
-              <a:rPr lang="en-US" dirty="0" err="1" smtClean="0"/>
-              <a:t>tidyverse</a:t>
-            </a:r>
-            <a:r>
-              <a:rPr lang="en-US" dirty="0" smtClean="0"/>
-              <a:t>, which loads a family of packages</a:t>
-            </a:r>
-          </a:p>
-          <a:p>
-            <a:pPr lvl="1"/>
-            <a:r>
-              <a:rPr lang="en-US" dirty="0" err="1" smtClean="0"/>
-              <a:t>rsample</a:t>
-            </a:r>
-            <a:r>
-              <a:rPr lang="en-US" dirty="0" smtClean="0"/>
-              <a:t>, recipes, caret, parsnip, yardstick, etc</a:t>
-            </a:r>
-            <a:r>
-              <a:rPr lang="en-US" dirty="0" smtClean="0"/>
-              <a:t>…</a:t>
-            </a:r>
-          </a:p>
-          <a:p>
-            <a:pPr lvl="1"/>
-            <a:r>
-              <a:rPr lang="en-US" dirty="0"/>
-              <a:t>https://github.com/topepo/rstudio-conf-2019</a:t>
-            </a:r>
-            <a:endParaRPr lang="en-US" dirty="0" smtClean="0"/>
-          </a:p>
-          <a:p>
-            <a:r>
-              <a:rPr lang="en-US" dirty="0" err="1">
-                <a:solidFill>
-                  <a:srgbClr val="FF0000"/>
-                </a:solidFill>
-              </a:rPr>
-              <a:t>rayshader</a:t>
-            </a:r>
-            <a:r>
-              <a:rPr lang="en-US" dirty="0" smtClean="0"/>
-              <a:t> package for elevation </a:t>
-            </a:r>
-            <a:r>
-              <a:rPr lang="en-US" dirty="0" smtClean="0"/>
-              <a:t>mapping</a:t>
-            </a:r>
-            <a:endParaRPr lang="en-US" dirty="0"/>
-          </a:p>
-        </p:txBody>
-      </p:sp>
-    </p:spTree>
-    <p:extLst>
-      <p:ext uri="{BB962C8B-B14F-4D97-AF65-F5344CB8AC3E}">
-        <p14:creationId xmlns:p14="http://schemas.microsoft.com/office/powerpoint/2010/main" val="817596751"/>
-      </p:ext>
-    </p:extLst>
-  </p:cSld>
-  <p:clrMapOvr>
-    <a:masterClrMapping/>
-  </p:clrMapOvr>
-</p:sld>
-</file>
-
 <file path=ppt/slides/slide6.xml><?xml version="1.0" encoding="utf-8"?>
 <p:sld xmlns:a="http://schemas.openxmlformats.org/drawingml/2006/main" xmlns:r="http://schemas.openxmlformats.org/officeDocument/2006/relationships" xmlns:p="http://schemas.openxmlformats.org/presentationml/2006/main">
   <p:cSld>
@@ -3642,91 +6007,67 @@
         </p:nvSpPr>
         <p:spPr/>
         <p:txBody>
-          <a:bodyPr>
-            <a:normAutofit/>
-          </a:bodyPr>
-          <a:lstStyle/>
+          <a:bodyPr/>
+          <a:lstStyle/>
+          <a:p>
+            <a:r>
+              <a:rPr lang="en-US" dirty="0" smtClean="0"/>
+              <a:t>R for Data Science</a:t>
+            </a:r>
+            <a:endParaRPr lang="en-US" dirty="0"/>
+          </a:p>
+        </p:txBody>
+      </p:sp>
+      <p:sp>
+        <p:nvSpPr>
+          <p:cNvPr id="3" name="Content Placeholder 2"/>
+          <p:cNvSpPr>
+            <a:spLocks noGrp="1"/>
+          </p:cNvSpPr>
+          <p:nvPr>
+            <p:ph idx="1"/>
+          </p:nvPr>
+        </p:nvSpPr>
+        <p:spPr/>
+        <p:txBody>
+          <a:bodyPr/>
+          <a:lstStyle/>
+          <a:p>
+            <a:r>
+              <a:rPr lang="en-US" dirty="0" smtClean="0"/>
+              <a:t>Mutate</a:t>
+            </a:r>
+          </a:p>
           <a:p>
             <a:r>
               <a:rPr lang="en-US" dirty="0" err="1" smtClean="0"/>
-              <a:t>Felienne</a:t>
-            </a:r>
-            <a:endParaRPr lang="en-US" dirty="0"/>
-          </a:p>
-        </p:txBody>
-      </p:sp>
-      <p:sp>
-        <p:nvSpPr>
-          <p:cNvPr id="3" name="Content Placeholder 2"/>
-          <p:cNvSpPr>
-            <a:spLocks noGrp="1"/>
-          </p:cNvSpPr>
-          <p:nvPr>
-            <p:ph idx="1"/>
-          </p:nvPr>
-        </p:nvSpPr>
-        <p:spPr/>
-        <p:txBody>
-          <a:bodyPr/>
-          <a:lstStyle/>
-          <a:p>
-            <a:pPr marL="0" indent="0">
-              <a:buNone/>
-            </a:pPr>
-            <a:r>
-              <a:rPr lang="en-US" b="1" dirty="0">
-                <a:hlinkClick r:id="rId2"/>
-              </a:rPr>
-              <a:t>@</a:t>
-            </a:r>
-            <a:r>
-              <a:rPr lang="en-US" b="1" dirty="0" err="1">
-                <a:hlinkClick r:id="rId2"/>
-              </a:rPr>
-              <a:t>Felienne</a:t>
-            </a:r>
-            <a:endParaRPr lang="en-US" b="1" dirty="0"/>
-          </a:p>
-          <a:p>
-            <a:pPr marL="0" indent="0">
-              <a:buNone/>
-            </a:pPr>
+              <a:t>Summarise</a:t>
+            </a:r>
             <a:endParaRPr lang="en-US" dirty="0" smtClean="0"/>
           </a:p>
           <a:p>
-            <a:pPr marL="0" indent="0">
-              <a:buNone/>
-            </a:pPr>
-            <a:r>
-              <a:rPr lang="en-US" dirty="0" smtClean="0"/>
-              <a:t>Programmers can be snotty (Excel IS coding). </a:t>
-            </a:r>
-          </a:p>
-          <a:p>
-            <a:pPr marL="0" indent="0">
-              <a:buNone/>
-            </a:pPr>
-            <a:r>
-              <a:rPr lang="en-US" dirty="0"/>
-              <a:t>We have no idea how to teach coding. </a:t>
-            </a:r>
-          </a:p>
-          <a:p>
-            <a:pPr marL="0" indent="0">
-              <a:buNone/>
-            </a:pPr>
-            <a:r>
-              <a:rPr lang="en-US" dirty="0" smtClean="0"/>
-              <a:t>Exploratory learning in coding doesn’t work. </a:t>
-            </a:r>
-          </a:p>
-          <a:p>
-            <a:pPr marL="0" indent="0">
-              <a:buNone/>
-            </a:pPr>
-            <a:r>
-              <a:rPr lang="en-US" dirty="0" smtClean="0"/>
-              <a:t>Making you read your code out loud helps you learn it better</a:t>
+            <a:r>
+              <a:rPr lang="en-US" dirty="0" smtClean="0"/>
+              <a:t>Filter</a:t>
+            </a:r>
+          </a:p>
+          <a:p>
+            <a:r>
+              <a:rPr lang="en-US" dirty="0" smtClean="0"/>
+              <a:t>Select</a:t>
+            </a:r>
+          </a:p>
+          <a:p>
+            <a:r>
+              <a:rPr lang="en-US" dirty="0" err="1" smtClean="0"/>
+              <a:t>Group_by</a:t>
+            </a:r>
+            <a:endParaRPr lang="en-US" dirty="0" smtClean="0"/>
+          </a:p>
+          <a:p>
+            <a:r>
+              <a:rPr lang="en-US" dirty="0" smtClean="0"/>
+              <a:t>%&gt;%</a:t>
             </a:r>
             <a:endParaRPr lang="en-US" dirty="0"/>
           </a:p>
@@ -3735,7 +6076,7 @@
     </p:spTree>
     <p:extLst>
       <p:ext uri="{BB962C8B-B14F-4D97-AF65-F5344CB8AC3E}">
-        <p14:creationId xmlns:p14="http://schemas.microsoft.com/office/powerpoint/2010/main" val="3025562129"/>
+        <p14:creationId xmlns:p14="http://schemas.microsoft.com/office/powerpoint/2010/main" val="4031042188"/>
       </p:ext>
     </p:extLst>
   </p:cSld>
@@ -3774,14 +6115,12 @@
         </p:nvSpPr>
         <p:spPr/>
         <p:txBody>
-          <a:bodyPr>
-            <a:normAutofit/>
-          </a:bodyPr>
-          <a:lstStyle/>
-          <a:p>
-            <a:r>
-              <a:rPr lang="en-US" dirty="0" smtClean="0"/>
-              <a:t>Brooke Watson, ACLU Analytics</a:t>
+          <a:bodyPr/>
+          <a:lstStyle/>
+          <a:p>
+            <a:r>
+              <a:rPr lang="en-US" dirty="0" smtClean="0"/>
+              <a:t>Readability, reproducibility</a:t>
             </a:r>
             <a:endParaRPr lang="en-US" dirty="0"/>
           </a:p>
@@ -3806,8 +6145,54 @@
               <a:buNone/>
             </a:pPr>
             <a:r>
-              <a:rPr lang="en-US" dirty="0" smtClean="0"/>
-              <a:t>The data we collect (and how we handle it) reflects our values</a:t>
+              <a:rPr lang="en-US" dirty="0" err="1" smtClean="0"/>
+              <a:t>dat</a:t>
+            </a:r>
+            <a:r>
+              <a:rPr lang="en-US" dirty="0" smtClean="0"/>
+              <a:t> %&gt;%</a:t>
+            </a:r>
+          </a:p>
+          <a:p>
+            <a:pPr marL="0" indent="0">
+              <a:buNone/>
+            </a:pPr>
+            <a:r>
+              <a:rPr lang="en-US" dirty="0"/>
+              <a:t> </a:t>
+            </a:r>
+            <a:r>
+              <a:rPr lang="en-US" dirty="0" smtClean="0"/>
+              <a:t> </a:t>
+            </a:r>
+            <a:r>
+              <a:rPr lang="en-US" dirty="0" err="1" smtClean="0"/>
+              <a:t>mutate_if</a:t>
+            </a:r>
+            <a:r>
+              <a:rPr lang="en-US" dirty="0" smtClean="0"/>
+              <a:t>(</a:t>
+            </a:r>
+            <a:r>
+              <a:rPr lang="en-US" dirty="0" err="1" smtClean="0"/>
+              <a:t>is.numeric</a:t>
+            </a:r>
+            <a:r>
+              <a:rPr lang="en-US" dirty="0" smtClean="0"/>
+              <a:t>, log) %&gt;%</a:t>
+            </a:r>
+          </a:p>
+          <a:p>
+            <a:pPr marL="0" indent="0">
+              <a:buNone/>
+            </a:pPr>
+            <a:r>
+              <a:rPr lang="en-US" dirty="0"/>
+              <a:t>  </a:t>
+            </a:r>
+            <a:r>
+              <a:rPr lang="en-US" dirty="0" smtClean="0"/>
+              <a:t>filter(sex == “F”)</a:t>
             </a:r>
           </a:p>
           <a:p>
@@ -3822,19 +6207,40 @@
             </a:pPr>
             <a:r>
               <a:rPr lang="en-US" dirty="0" smtClean="0"/>
-              <a:t>No central database to keep track of children separated from their parents at the border (?!?)</a:t>
-            </a:r>
-          </a:p>
-          <a:p>
-            <a:pPr marL="0" indent="0">
-              <a:buNone/>
-            </a:pPr>
-            <a:endParaRPr lang="en-US" dirty="0" smtClean="0"/>
-          </a:p>
-          <a:p>
-            <a:pPr marL="0" indent="0">
-              <a:buNone/>
-            </a:pPr>
+              <a:t>Versus</a:t>
+            </a:r>
+          </a:p>
+          <a:p>
+            <a:pPr marL="0" indent="0">
+              <a:buNone/>
+            </a:pPr>
+            <a:endParaRPr lang="en-US" dirty="0"/>
+          </a:p>
+          <a:p>
+            <a:pPr marL="0" indent="0">
+              <a:buNone/>
+            </a:pPr>
+            <a:r>
+              <a:rPr lang="en-US" dirty="0" smtClean="0"/>
+              <a:t>Dat2 &lt;- log(</a:t>
+            </a:r>
+            <a:r>
+              <a:rPr lang="en-US" dirty="0" err="1" smtClean="0"/>
+              <a:t>dat</a:t>
+            </a:r>
+            <a:r>
+              <a:rPr lang="en-US" dirty="0" smtClean="0"/>
+              <a:t>[, (5:13)])</a:t>
+            </a:r>
+          </a:p>
+          <a:p>
+            <a:pPr marL="0" indent="0">
+              <a:buNone/>
+            </a:pPr>
+            <a:r>
+              <a:rPr lang="en-US" dirty="0" smtClean="0"/>
+              <a:t>Dat3 &lt;- subset(dat2, sex == “F”)</a:t>
+            </a:r>
             <a:endParaRPr lang="en-US" dirty="0"/>
           </a:p>
         </p:txBody>
@@ -3842,7 +6248,7 @@
     </p:spTree>
     <p:extLst>
       <p:ext uri="{BB962C8B-B14F-4D97-AF65-F5344CB8AC3E}">
-        <p14:creationId xmlns:p14="http://schemas.microsoft.com/office/powerpoint/2010/main" val="4263579149"/>
+        <p14:creationId xmlns:p14="http://schemas.microsoft.com/office/powerpoint/2010/main" val="4229725476"/>
       </p:ext>
     </p:extLst>
   </p:cSld>
@@ -3881,14 +6287,12 @@
         </p:nvSpPr>
         <p:spPr/>
         <p:txBody>
-          <a:bodyPr>
-            <a:normAutofit/>
-          </a:bodyPr>
-          <a:lstStyle/>
-          <a:p>
-            <a:r>
-              <a:rPr lang="en-US" dirty="0" smtClean="0"/>
-              <a:t>Reproducibility</a:t>
+          <a:bodyPr/>
+          <a:lstStyle/>
+          <a:p>
+            <a:r>
+              <a:rPr lang="en-US" dirty="0" err="1" smtClean="0"/>
+              <a:t>rstudio</a:t>
             </a:r>
             <a:endParaRPr lang="en-US" dirty="0"/>
           </a:p>
@@ -3909,62 +6313,269 @@
           <a:bodyPr/>
           <a:lstStyle/>
           <a:p>
-            <a:pPr marL="0" indent="0">
-              <a:buNone/>
-            </a:pPr>
-            <a:r>
-              <a:rPr lang="en-US" dirty="0" smtClean="0"/>
-              <a:t>Companies have it figured out. </a:t>
-            </a:r>
-          </a:p>
-          <a:p>
-            <a:pPr marL="0" indent="0">
-              <a:buNone/>
-            </a:pPr>
+            <a:r>
+              <a:rPr lang="en-US" dirty="0" smtClean="0"/>
+              <a:t>50% development staff = open-source projects</a:t>
+            </a:r>
+          </a:p>
+          <a:p>
+            <a:r>
+              <a:rPr lang="en-US" dirty="0" smtClean="0"/>
+              <a:t>50% = </a:t>
+            </a:r>
+            <a:r>
+              <a:rPr lang="en-US" dirty="0" err="1" smtClean="0"/>
+              <a:t>rstudio</a:t>
+            </a:r>
+            <a:r>
+              <a:rPr lang="en-US" dirty="0" smtClean="0"/>
+              <a:t> products</a:t>
+            </a:r>
+          </a:p>
+          <a:p>
+            <a:endParaRPr lang="en-US" dirty="0" smtClean="0"/>
+          </a:p>
+          <a:p>
             <a:endParaRPr lang="en-US" dirty="0"/>
           </a:p>
-          <a:p>
-            <a:pPr marL="0" indent="0">
-              <a:buNone/>
-            </a:pPr>
-            <a:r>
-              <a:rPr lang="en-US" dirty="0" smtClean="0"/>
-              <a:t>Academia and the government, not so much. </a:t>
-            </a:r>
-          </a:p>
-          <a:p>
-            <a:pPr marL="0" indent="0">
-              <a:buNone/>
-            </a:pPr>
-            <a:endParaRPr lang="en-US" dirty="0"/>
-          </a:p>
-          <a:p>
-            <a:pPr marL="0" indent="0">
-              <a:buNone/>
-            </a:pPr>
-            <a:r>
-              <a:rPr lang="en-US" dirty="0" smtClean="0"/>
-              <a:t>Getting better!</a:t>
-            </a:r>
-          </a:p>
-          <a:p>
-            <a:pPr marL="0" indent="0">
-              <a:buNone/>
-            </a:pPr>
-            <a:endParaRPr lang="en-US" dirty="0" smtClean="0"/>
-          </a:p>
-          <a:p>
-            <a:pPr marL="0" indent="0">
-              <a:buNone/>
-            </a:pPr>
-            <a:endParaRPr lang="en-US" dirty="0"/>
-          </a:p>
-        </p:txBody>
-      </p:sp>
+        </p:txBody>
+      </p:sp>
+      <p:pic>
+        <p:nvPicPr>
+          <p:cNvPr id="4" name="Picture 3"/>
+          <p:cNvPicPr>
+            <a:picLocks noChangeAspect="1"/>
+          </p:cNvPicPr>
+          <p:nvPr/>
+        </p:nvPicPr>
+        <p:blipFill>
+          <a:blip r:embed="rId2">
+            <a:extLst>
+              <a:ext uri="{28A0092B-C50C-407E-A947-70E740481C1C}">
+                <a14:useLocalDpi xmlns:a14="http://schemas.microsoft.com/office/drawing/2010/main" val="0"/>
+              </a:ext>
+            </a:extLst>
+          </a:blip>
+          <a:stretch>
+            <a:fillRect/>
+          </a:stretch>
+        </p:blipFill>
+        <p:spPr>
+          <a:xfrm>
+            <a:off x="909637" y="266700"/>
+            <a:ext cx="10372725" cy="6324600"/>
+          </a:xfrm>
+          <a:prstGeom prst="rect">
+            <a:avLst/>
+          </a:prstGeom>
+        </p:spPr>
+      </p:pic>
     </p:spTree>
     <p:extLst>
       <p:ext uri="{BB962C8B-B14F-4D97-AF65-F5344CB8AC3E}">
-        <p14:creationId xmlns:p14="http://schemas.microsoft.com/office/powerpoint/2010/main" val="3509103729"/>
+        <p14:creationId xmlns:p14="http://schemas.microsoft.com/office/powerpoint/2010/main" val="4192851536"/>
+      </p:ext>
+    </p:extLst>
+  </p:cSld>
+  <p:clrMapOvr>
+    <a:masterClrMapping/>
+  </p:clrMapOvr>
+</p:sld>
+</file>
+
+<file path=ppt/slides/slide9.xml><?xml version="1.0" encoding="utf-8"?>
+<p:sld xmlns:a="http://schemas.openxmlformats.org/drawingml/2006/main" xmlns:r="http://schemas.openxmlformats.org/officeDocument/2006/relationships" xmlns:p="http://schemas.openxmlformats.org/presentationml/2006/main">
+  <p:cSld>
+    <p:spTree>
+      <p:nvGrpSpPr>
+        <p:cNvPr id="1" name=""/>
+        <p:cNvGrpSpPr/>
+        <p:nvPr/>
+      </p:nvGrpSpPr>
+      <p:grpSpPr>
+        <a:xfrm>
+          <a:off x="0" y="0"/>
+          <a:ext cx="0" cy="0"/>
+          <a:chOff x="0" y="0"/>
+          <a:chExt cx="0" cy="0"/>
+        </a:xfrm>
+      </p:grpSpPr>
+      <p:sp>
+        <p:nvSpPr>
+          <p:cNvPr id="2" name="Title 1"/>
+          <p:cNvSpPr>
+            <a:spLocks noGrp="1"/>
+          </p:cNvSpPr>
+          <p:nvPr>
+            <p:ph type="title"/>
+          </p:nvPr>
+        </p:nvSpPr>
+        <p:spPr/>
+        <p:txBody>
+          <a:bodyPr/>
+          <a:lstStyle/>
+          <a:p>
+            <a:endParaRPr lang="en-US"/>
+          </a:p>
+        </p:txBody>
+      </p:sp>
+      <p:sp>
+        <p:nvSpPr>
+          <p:cNvPr id="3" name="Content Placeholder 2"/>
+          <p:cNvSpPr>
+            <a:spLocks noGrp="1"/>
+          </p:cNvSpPr>
+          <p:nvPr>
+            <p:ph idx="1"/>
+          </p:nvPr>
+        </p:nvSpPr>
+        <p:spPr/>
+        <p:txBody>
+          <a:bodyPr>
+            <a:normAutofit lnSpcReduction="10000"/>
+          </a:bodyPr>
+          <a:lstStyle/>
+          <a:p>
+            <a:r>
+              <a:rPr lang="en-US" dirty="0" err="1" smtClean="0">
+                <a:solidFill>
+                  <a:srgbClr val="FF0000"/>
+                </a:solidFill>
+              </a:rPr>
+              <a:t>gt</a:t>
+            </a:r>
+            <a:r>
+              <a:rPr lang="en-US" dirty="0" smtClean="0"/>
+              <a:t> package for tables</a:t>
+            </a:r>
+          </a:p>
+          <a:p>
+            <a:r>
+              <a:rPr lang="en-US" dirty="0" err="1">
+                <a:solidFill>
+                  <a:srgbClr val="FF0000"/>
+                </a:solidFill>
+              </a:rPr>
+              <a:t>gganimate</a:t>
+            </a:r>
+            <a:r>
+              <a:rPr lang="en-US" dirty="0" smtClean="0"/>
+              <a:t> for moving figures (updated package is completely different from old one, and is on CRAN)</a:t>
+            </a:r>
+          </a:p>
+          <a:p>
+            <a:r>
+              <a:rPr lang="en-US" dirty="0">
+                <a:solidFill>
+                  <a:srgbClr val="FF0000"/>
+                </a:solidFill>
+              </a:rPr>
+              <a:t>here</a:t>
+            </a:r>
+            <a:r>
+              <a:rPr lang="en-US" dirty="0" smtClean="0"/>
+              <a:t> package for working directory things</a:t>
+            </a:r>
+            <a:endParaRPr lang="en-US" dirty="0">
+              <a:solidFill>
+                <a:srgbClr val="FF0000"/>
+              </a:solidFill>
+            </a:endParaRPr>
+          </a:p>
+          <a:p>
+            <a:pPr marL="0" indent="0">
+              <a:buNone/>
+            </a:pPr>
+            <a:r>
+              <a:rPr lang="en-US" sz="2400" dirty="0" smtClean="0"/>
+              <a:t>https://malco.io/2018/11/05/why-should-i-use-the-here-package/</a:t>
+            </a:r>
+          </a:p>
+          <a:p>
+            <a:r>
+              <a:rPr lang="en-US" dirty="0" err="1">
+                <a:solidFill>
+                  <a:srgbClr val="FF0000"/>
+                </a:solidFill>
+              </a:rPr>
+              <a:t>tidymodels</a:t>
+            </a:r>
+            <a:r>
+              <a:rPr lang="en-US" dirty="0" smtClean="0"/>
+              <a:t> package</a:t>
+            </a:r>
+          </a:p>
+          <a:p>
+            <a:pPr lvl="1"/>
+            <a:r>
+              <a:rPr lang="en-US" dirty="0" smtClean="0"/>
+              <a:t>Akin to the </a:t>
+            </a:r>
+            <a:r>
+              <a:rPr lang="en-US" dirty="0" err="1" smtClean="0"/>
+              <a:t>tidyverse</a:t>
+            </a:r>
+            <a:r>
+              <a:rPr lang="en-US" dirty="0" smtClean="0"/>
+              <a:t>, which loads a family of packages</a:t>
+            </a:r>
+          </a:p>
+          <a:p>
+            <a:pPr lvl="1"/>
+            <a:r>
+              <a:rPr lang="en-US" dirty="0" err="1" smtClean="0"/>
+              <a:t>rsample</a:t>
+            </a:r>
+            <a:r>
+              <a:rPr lang="en-US" dirty="0" smtClean="0"/>
+              <a:t>, recipes, caret, parsnip, yardstick, </a:t>
+            </a:r>
+            <a:r>
+              <a:rPr lang="en-US" dirty="0" smtClean="0"/>
+              <a:t>broom, etc</a:t>
+            </a:r>
+            <a:r>
+              <a:rPr lang="en-US" dirty="0" smtClean="0"/>
+              <a:t>…</a:t>
+            </a:r>
+          </a:p>
+          <a:p>
+            <a:pPr lvl="1"/>
+            <a:r>
+              <a:rPr lang="en-US" dirty="0" smtClean="0"/>
+              <a:t>In the </a:t>
+            </a:r>
+            <a:r>
+              <a:rPr lang="en-US" dirty="0" err="1" smtClean="0"/>
+              <a:t>github</a:t>
+            </a:r>
+            <a:r>
+              <a:rPr lang="en-US" dirty="0" smtClean="0"/>
+              <a:t> repo</a:t>
+            </a:r>
+            <a:endParaRPr lang="en-US" dirty="0" smtClean="0"/>
+          </a:p>
+          <a:p>
+            <a:r>
+              <a:rPr lang="en-US" dirty="0" err="1">
+                <a:solidFill>
+                  <a:srgbClr val="FF0000"/>
+                </a:solidFill>
+              </a:rPr>
+              <a:t>rayshader</a:t>
+            </a:r>
+            <a:r>
+              <a:rPr lang="en-US" dirty="0" smtClean="0"/>
+              <a:t> package for elevation mapping</a:t>
+            </a:r>
+            <a:endParaRPr lang="en-US" dirty="0"/>
+          </a:p>
+        </p:txBody>
+      </p:sp>
+    </p:spTree>
+    <p:extLst>
+      <p:ext uri="{BB962C8B-B14F-4D97-AF65-F5344CB8AC3E}">
+        <p14:creationId xmlns:p14="http://schemas.microsoft.com/office/powerpoint/2010/main" val="817596751"/>
       </p:ext>
     </p:extLst>
   </p:cSld>

</xml_diff>